<commit_message>
working on negative sampling
</commit_message>
<xml_diff>
--- a/content/downloads/notebooks/spatial.pptx
+++ b/content/downloads/notebooks/spatial.pptx
@@ -5,45 +5,46 @@
     <p:sldMasterId id="2147483648" r:id="rId1"/>
   </p:sldMasterIdLst>
   <p:notesMasterIdLst>
-    <p:notesMasterId r:id="rId38"/>
+    <p:notesMasterId r:id="rId39"/>
   </p:notesMasterIdLst>
   <p:sldIdLst>
     <p:sldId id="259" r:id="rId2"/>
-    <p:sldId id="276" r:id="rId3"/>
-    <p:sldId id="286" r:id="rId4"/>
-    <p:sldId id="285" r:id="rId5"/>
-    <p:sldId id="284" r:id="rId6"/>
-    <p:sldId id="288" r:id="rId7"/>
-    <p:sldId id="290" r:id="rId8"/>
-    <p:sldId id="291" r:id="rId9"/>
-    <p:sldId id="289" r:id="rId10"/>
-    <p:sldId id="287" r:id="rId11"/>
-    <p:sldId id="283" r:id="rId12"/>
-    <p:sldId id="282" r:id="rId13"/>
-    <p:sldId id="281" r:id="rId14"/>
-    <p:sldId id="273" r:id="rId15"/>
-    <p:sldId id="274" r:id="rId16"/>
-    <p:sldId id="280" r:id="rId17"/>
-    <p:sldId id="278" r:id="rId18"/>
-    <p:sldId id="275" r:id="rId19"/>
-    <p:sldId id="279" r:id="rId20"/>
-    <p:sldId id="277" r:id="rId21"/>
-    <p:sldId id="272" r:id="rId22"/>
-    <p:sldId id="269" r:id="rId23"/>
-    <p:sldId id="270" r:id="rId24"/>
-    <p:sldId id="271" r:id="rId25"/>
-    <p:sldId id="267" r:id="rId26"/>
-    <p:sldId id="268" r:id="rId27"/>
-    <p:sldId id="260" r:id="rId28"/>
-    <p:sldId id="261" r:id="rId29"/>
-    <p:sldId id="256" r:id="rId30"/>
-    <p:sldId id="257" r:id="rId31"/>
-    <p:sldId id="258" r:id="rId32"/>
-    <p:sldId id="262" r:id="rId33"/>
-    <p:sldId id="263" r:id="rId34"/>
-    <p:sldId id="265" r:id="rId35"/>
-    <p:sldId id="264" r:id="rId36"/>
-    <p:sldId id="266" r:id="rId37"/>
+    <p:sldId id="292" r:id="rId3"/>
+    <p:sldId id="276" r:id="rId4"/>
+    <p:sldId id="286" r:id="rId5"/>
+    <p:sldId id="285" r:id="rId6"/>
+    <p:sldId id="284" r:id="rId7"/>
+    <p:sldId id="288" r:id="rId8"/>
+    <p:sldId id="290" r:id="rId9"/>
+    <p:sldId id="291" r:id="rId10"/>
+    <p:sldId id="289" r:id="rId11"/>
+    <p:sldId id="287" r:id="rId12"/>
+    <p:sldId id="283" r:id="rId13"/>
+    <p:sldId id="282" r:id="rId14"/>
+    <p:sldId id="281" r:id="rId15"/>
+    <p:sldId id="273" r:id="rId16"/>
+    <p:sldId id="274" r:id="rId17"/>
+    <p:sldId id="280" r:id="rId18"/>
+    <p:sldId id="278" r:id="rId19"/>
+    <p:sldId id="275" r:id="rId20"/>
+    <p:sldId id="279" r:id="rId21"/>
+    <p:sldId id="277" r:id="rId22"/>
+    <p:sldId id="272" r:id="rId23"/>
+    <p:sldId id="269" r:id="rId24"/>
+    <p:sldId id="270" r:id="rId25"/>
+    <p:sldId id="271" r:id="rId26"/>
+    <p:sldId id="267" r:id="rId27"/>
+    <p:sldId id="268" r:id="rId28"/>
+    <p:sldId id="260" r:id="rId29"/>
+    <p:sldId id="261" r:id="rId30"/>
+    <p:sldId id="256" r:id="rId31"/>
+    <p:sldId id="257" r:id="rId32"/>
+    <p:sldId id="258" r:id="rId33"/>
+    <p:sldId id="262" r:id="rId34"/>
+    <p:sldId id="263" r:id="rId35"/>
+    <p:sldId id="265" r:id="rId36"/>
+    <p:sldId id="264" r:id="rId37"/>
+    <p:sldId id="266" r:id="rId38"/>
   </p:sldIdLst>
   <p:sldSz cx="12192000" cy="6858000"/>
   <p:notesSz cx="6858000" cy="9144000"/>
@@ -232,7 +233,7 @@
           <a:p>
             <a:fld id="{9998EBF7-E37E-451A-80F7-AFA2845CD1FE}" type="datetimeFigureOut">
               <a:rPr lang="en-US" smtClean="0"/>
-              <a:t>5/7/2019</a:t>
+              <a:t>5/23/2019</a:t>
             </a:fld>
             <a:endParaRPr lang="en-US"/>
           </a:p>
@@ -564,7 +565,7 @@
           <a:p>
             <a:fld id="{4B30C246-FA32-4A68-BC2D-EA5A31DF2892}" type="slidenum">
               <a:rPr lang="en-US" smtClean="0"/>
-              <a:t>15</a:t>
+              <a:t>6</a:t>
             </a:fld>
             <a:endParaRPr lang="en-US"/>
           </a:p>
@@ -573,7 +574,7 @@
     </p:spTree>
     <p:extLst>
       <p:ext uri="{BB962C8B-B14F-4D97-AF65-F5344CB8AC3E}">
-        <p14:creationId xmlns:p14="http://schemas.microsoft.com/office/powerpoint/2010/main" val="1325890584"/>
+        <p14:creationId xmlns:p14="http://schemas.microsoft.com/office/powerpoint/2010/main" val="3721584419"/>
       </p:ext>
     </p:extLst>
   </p:cSld>
@@ -648,7 +649,7 @@
           <a:p>
             <a:fld id="{4B30C246-FA32-4A68-BC2D-EA5A31DF2892}" type="slidenum">
               <a:rPr lang="en-US" smtClean="0"/>
-              <a:t>18</a:t>
+              <a:t>16</a:t>
             </a:fld>
             <a:endParaRPr lang="en-US"/>
           </a:p>
@@ -657,7 +658,7 @@
     </p:spTree>
     <p:extLst>
       <p:ext uri="{BB962C8B-B14F-4D97-AF65-F5344CB8AC3E}">
-        <p14:creationId xmlns:p14="http://schemas.microsoft.com/office/powerpoint/2010/main" val="39266184"/>
+        <p14:creationId xmlns:p14="http://schemas.microsoft.com/office/powerpoint/2010/main" val="1325890584"/>
       </p:ext>
     </p:extLst>
   </p:cSld>
@@ -732,7 +733,91 @@
           <a:p>
             <a:fld id="{4B30C246-FA32-4A68-BC2D-EA5A31DF2892}" type="slidenum">
               <a:rPr lang="en-US" smtClean="0"/>
-              <a:t>20</a:t>
+              <a:t>19</a:t>
+            </a:fld>
+            <a:endParaRPr lang="en-US"/>
+          </a:p>
+        </p:txBody>
+      </p:sp>
+    </p:spTree>
+    <p:extLst>
+      <p:ext uri="{BB962C8B-B14F-4D97-AF65-F5344CB8AC3E}">
+        <p14:creationId xmlns:p14="http://schemas.microsoft.com/office/powerpoint/2010/main" val="39266184"/>
+      </p:ext>
+    </p:extLst>
+  </p:cSld>
+  <p:clrMapOvr>
+    <a:masterClrMapping/>
+  </p:clrMapOvr>
+</p:notes>
+</file>
+
+<file path=ppt/notesSlides/notesSlide4.xml><?xml version="1.0" encoding="utf-8"?>
+<p:notes xmlns:a="http://schemas.openxmlformats.org/drawingml/2006/main" xmlns:r="http://schemas.openxmlformats.org/officeDocument/2006/relationships" xmlns:p="http://schemas.openxmlformats.org/presentationml/2006/main">
+  <p:cSld>
+    <p:spTree>
+      <p:nvGrpSpPr>
+        <p:cNvPr id="1" name=""/>
+        <p:cNvGrpSpPr/>
+        <p:nvPr/>
+      </p:nvGrpSpPr>
+      <p:grpSpPr>
+        <a:xfrm>
+          <a:off x="0" y="0"/>
+          <a:ext cx="0" cy="0"/>
+          <a:chOff x="0" y="0"/>
+          <a:chExt cx="0" cy="0"/>
+        </a:xfrm>
+      </p:grpSpPr>
+      <p:sp>
+        <p:nvSpPr>
+          <p:cNvPr id="2" name="Slide Image Placeholder 1"/>
+          <p:cNvSpPr>
+            <a:spLocks noGrp="1" noRot="1" noChangeAspect="1"/>
+          </p:cNvSpPr>
+          <p:nvPr>
+            <p:ph type="sldImg"/>
+          </p:nvPr>
+        </p:nvSpPr>
+        <p:spPr/>
+      </p:sp>
+      <p:sp>
+        <p:nvSpPr>
+          <p:cNvPr id="3" name="Notes Placeholder 2"/>
+          <p:cNvSpPr>
+            <a:spLocks noGrp="1"/>
+          </p:cNvSpPr>
+          <p:nvPr>
+            <p:ph type="body" idx="1"/>
+          </p:nvPr>
+        </p:nvSpPr>
+        <p:spPr/>
+        <p:txBody>
+          <a:bodyPr/>
+          <a:lstStyle/>
+          <a:p>
+            <a:endParaRPr lang="en-US" dirty="0"/>
+          </a:p>
+        </p:txBody>
+      </p:sp>
+      <p:sp>
+        <p:nvSpPr>
+          <p:cNvPr id="4" name="Slide Number Placeholder 3"/>
+          <p:cNvSpPr>
+            <a:spLocks noGrp="1"/>
+          </p:cNvSpPr>
+          <p:nvPr>
+            <p:ph type="sldNum" sz="quarter" idx="5"/>
+          </p:nvPr>
+        </p:nvSpPr>
+        <p:spPr/>
+        <p:txBody>
+          <a:bodyPr/>
+          <a:lstStyle/>
+          <a:p>
+            <a:fld id="{4B30C246-FA32-4A68-BC2D-EA5A31DF2892}" type="slidenum">
+              <a:rPr lang="en-US" smtClean="0"/>
+              <a:t>21</a:t>
             </a:fld>
             <a:endParaRPr lang="en-US"/>
           </a:p>
@@ -898,7 +983,7 @@
           <a:p>
             <a:fld id="{ACE35D2E-2B05-4733-9312-EE9E9D5A91AC}" type="datetimeFigureOut">
               <a:rPr lang="en-US" smtClean="0"/>
-              <a:t>5/7/2019</a:t>
+              <a:t>5/23/2019</a:t>
             </a:fld>
             <a:endParaRPr lang="en-US"/>
           </a:p>
@@ -1096,7 +1181,7 @@
           <a:p>
             <a:fld id="{ACE35D2E-2B05-4733-9312-EE9E9D5A91AC}" type="datetimeFigureOut">
               <a:rPr lang="en-US" smtClean="0"/>
-              <a:t>5/7/2019</a:t>
+              <a:t>5/23/2019</a:t>
             </a:fld>
             <a:endParaRPr lang="en-US"/>
           </a:p>
@@ -1304,7 +1389,7 @@
           <a:p>
             <a:fld id="{ACE35D2E-2B05-4733-9312-EE9E9D5A91AC}" type="datetimeFigureOut">
               <a:rPr lang="en-US" smtClean="0"/>
-              <a:t>5/7/2019</a:t>
+              <a:t>5/23/2019</a:t>
             </a:fld>
             <a:endParaRPr lang="en-US"/>
           </a:p>
@@ -1502,7 +1587,7 @@
           <a:p>
             <a:fld id="{ACE35D2E-2B05-4733-9312-EE9E9D5A91AC}" type="datetimeFigureOut">
               <a:rPr lang="en-US" smtClean="0"/>
-              <a:t>5/7/2019</a:t>
+              <a:t>5/23/2019</a:t>
             </a:fld>
             <a:endParaRPr lang="en-US"/>
           </a:p>
@@ -1777,7 +1862,7 @@
           <a:p>
             <a:fld id="{ACE35D2E-2B05-4733-9312-EE9E9D5A91AC}" type="datetimeFigureOut">
               <a:rPr lang="en-US" smtClean="0"/>
-              <a:t>5/7/2019</a:t>
+              <a:t>5/23/2019</a:t>
             </a:fld>
             <a:endParaRPr lang="en-US"/>
           </a:p>
@@ -2042,7 +2127,7 @@
           <a:p>
             <a:fld id="{ACE35D2E-2B05-4733-9312-EE9E9D5A91AC}" type="datetimeFigureOut">
               <a:rPr lang="en-US" smtClean="0"/>
-              <a:t>5/7/2019</a:t>
+              <a:t>5/23/2019</a:t>
             </a:fld>
             <a:endParaRPr lang="en-US"/>
           </a:p>
@@ -2454,7 +2539,7 @@
           <a:p>
             <a:fld id="{ACE35D2E-2B05-4733-9312-EE9E9D5A91AC}" type="datetimeFigureOut">
               <a:rPr lang="en-US" smtClean="0"/>
-              <a:t>5/7/2019</a:t>
+              <a:t>5/23/2019</a:t>
             </a:fld>
             <a:endParaRPr lang="en-US"/>
           </a:p>
@@ -2595,7 +2680,7 @@
           <a:p>
             <a:fld id="{ACE35D2E-2B05-4733-9312-EE9E9D5A91AC}" type="datetimeFigureOut">
               <a:rPr lang="en-US" smtClean="0"/>
-              <a:t>5/7/2019</a:t>
+              <a:t>5/23/2019</a:t>
             </a:fld>
             <a:endParaRPr lang="en-US"/>
           </a:p>
@@ -2708,7 +2793,7 @@
           <a:p>
             <a:fld id="{ACE35D2E-2B05-4733-9312-EE9E9D5A91AC}" type="datetimeFigureOut">
               <a:rPr lang="en-US" smtClean="0"/>
-              <a:t>5/7/2019</a:t>
+              <a:t>5/23/2019</a:t>
             </a:fld>
             <a:endParaRPr lang="en-US"/>
           </a:p>
@@ -3019,7 +3104,7 @@
           <a:p>
             <a:fld id="{ACE35D2E-2B05-4733-9312-EE9E9D5A91AC}" type="datetimeFigureOut">
               <a:rPr lang="en-US" smtClean="0"/>
-              <a:t>5/7/2019</a:t>
+              <a:t>5/23/2019</a:t>
             </a:fld>
             <a:endParaRPr lang="en-US"/>
           </a:p>
@@ -3307,7 +3392,7 @@
           <a:p>
             <a:fld id="{ACE35D2E-2B05-4733-9312-EE9E9D5A91AC}" type="datetimeFigureOut">
               <a:rPr lang="en-US" smtClean="0"/>
-              <a:t>5/7/2019</a:t>
+              <a:t>5/23/2019</a:t>
             </a:fld>
             <a:endParaRPr lang="en-US"/>
           </a:p>
@@ -3548,7 +3633,7 @@
           <a:p>
             <a:fld id="{ACE35D2E-2B05-4733-9312-EE9E9D5A91AC}" type="datetimeFigureOut">
               <a:rPr lang="en-US" smtClean="0"/>
-              <a:t>5/7/2019</a:t>
+              <a:t>5/23/2019</a:t>
             </a:fld>
             <a:endParaRPr lang="en-US"/>
           </a:p>
@@ -8172,6 +8257,86 @@
           <a:chExt cx="0" cy="0"/>
         </a:xfrm>
       </p:grpSpPr>
+      <p:sp>
+        <p:nvSpPr>
+          <p:cNvPr id="2" name="Title 1">
+            <a:extLst>
+              <a:ext uri="{FF2B5EF4-FFF2-40B4-BE49-F238E27FC236}">
+                <a16:creationId xmlns:a16="http://schemas.microsoft.com/office/drawing/2014/main" id="{5ECDA26B-A948-4010-9842-419112015D6D}"/>
+              </a:ext>
+            </a:extLst>
+          </p:cNvPr>
+          <p:cNvSpPr>
+            <a:spLocks noGrp="1"/>
+          </p:cNvSpPr>
+          <p:nvPr>
+            <p:ph type="title"/>
+          </p:nvPr>
+        </p:nvSpPr>
+        <p:spPr/>
+        <p:txBody>
+          <a:bodyPr/>
+          <a:lstStyle/>
+          <a:p>
+            <a:endParaRPr lang="en-US"/>
+          </a:p>
+        </p:txBody>
+      </p:sp>
+      <p:sp>
+        <p:nvSpPr>
+          <p:cNvPr id="3" name="Content Placeholder 2">
+            <a:extLst>
+              <a:ext uri="{FF2B5EF4-FFF2-40B4-BE49-F238E27FC236}">
+                <a16:creationId xmlns:a16="http://schemas.microsoft.com/office/drawing/2014/main" id="{D0C286D1-AF2F-4EC6-B4B7-4B7CDC90DA4F}"/>
+              </a:ext>
+            </a:extLst>
+          </p:cNvPr>
+          <p:cNvSpPr>
+            <a:spLocks noGrp="1"/>
+          </p:cNvSpPr>
+          <p:nvPr>
+            <p:ph idx="1"/>
+          </p:nvPr>
+        </p:nvSpPr>
+        <p:spPr/>
+        <p:txBody>
+          <a:bodyPr/>
+          <a:lstStyle/>
+          <a:p>
+            <a:endParaRPr lang="en-US"/>
+          </a:p>
+        </p:txBody>
+      </p:sp>
+    </p:spTree>
+    <p:extLst>
+      <p:ext uri="{BB962C8B-B14F-4D97-AF65-F5344CB8AC3E}">
+        <p14:creationId xmlns:p14="http://schemas.microsoft.com/office/powerpoint/2010/main" val="2436602171"/>
+      </p:ext>
+    </p:extLst>
+  </p:cSld>
+  <p:clrMapOvr>
+    <a:masterClrMapping/>
+  </p:clrMapOvr>
+</p:sld>
+</file>
+
+<file path=ppt/slides/slide11.xml><?xml version="1.0" encoding="utf-8"?>
+<p:sld xmlns:a="http://schemas.openxmlformats.org/drawingml/2006/main" xmlns:r="http://schemas.openxmlformats.org/officeDocument/2006/relationships" xmlns:p="http://schemas.openxmlformats.org/presentationml/2006/main">
+  <p:cSld>
+    <p:spTree>
+      <p:nvGrpSpPr>
+        <p:cNvPr id="1" name=""/>
+        <p:cNvGrpSpPr/>
+        <p:nvPr/>
+      </p:nvGrpSpPr>
+      <p:grpSpPr>
+        <a:xfrm>
+          <a:off x="0" y="0"/>
+          <a:ext cx="0" cy="0"/>
+          <a:chOff x="0" y="0"/>
+          <a:chExt cx="0" cy="0"/>
+        </a:xfrm>
+      </p:grpSpPr>
     </p:spTree>
     <p:extLst>
       <p:ext uri="{BB962C8B-B14F-4D97-AF65-F5344CB8AC3E}">
@@ -8185,7 +8350,7 @@
 </p:sld>
 </file>
 
-<file path=ppt/slides/slide11.xml><?xml version="1.0" encoding="utf-8"?>
+<file path=ppt/slides/slide12.xml><?xml version="1.0" encoding="utf-8"?>
 <p:sld xmlns:a="http://schemas.openxmlformats.org/drawingml/2006/main" xmlns:r="http://schemas.openxmlformats.org/officeDocument/2006/relationships" xmlns:p="http://schemas.openxmlformats.org/presentationml/2006/main">
   <p:cSld>
     <p:spTree>
@@ -9577,6 +9742,54 @@
           </a:prstGeom>
         </p:spPr>
       </p:pic>
+      <p:sp>
+        <p:nvSpPr>
+          <p:cNvPr id="29" name="TextBox 28">
+            <a:extLst>
+              <a:ext uri="{FF2B5EF4-FFF2-40B4-BE49-F238E27FC236}">
+                <a16:creationId xmlns:a16="http://schemas.microsoft.com/office/drawing/2014/main" id="{C56CB65F-36CB-45CF-BF8B-8C2D145BD1D1}"/>
+              </a:ext>
+            </a:extLst>
+          </p:cNvPr>
+          <p:cNvSpPr txBox="1"/>
+          <p:nvPr/>
+        </p:nvSpPr>
+        <p:spPr>
+          <a:xfrm>
+            <a:off x="2243770" y="3898458"/>
+            <a:ext cx="2029121" cy="369332"/>
+          </a:xfrm>
+          <a:prstGeom prst="rect">
+            <a:avLst/>
+          </a:prstGeom>
+          <a:noFill/>
+        </p:spPr>
+        <p:txBody>
+          <a:bodyPr wrap="square" rtlCol="0">
+            <a:spAutoFit/>
+          </a:bodyPr>
+          <a:lstStyle/>
+          <a:p>
+            <a:r>
+              <a:rPr lang="en-US" dirty="0">
+                <a:solidFill>
+                  <a:schemeClr val="tx1">
+                    <a:alpha val="20000"/>
+                  </a:schemeClr>
+                </a:solidFill>
+                <a:effectLst>
+                  <a:outerShdw blurRad="50800" dist="50800" dir="5400000" algn="ctr" rotWithShape="0">
+                    <a:srgbClr val="000000">
+                      <a:alpha val="0"/>
+                    </a:srgbClr>
+                  </a:outerShdw>
+                </a:effectLst>
+              </a:rPr>
+              <a:t>aegis4048.github.io</a:t>
+            </a:r>
+          </a:p>
+        </p:txBody>
+      </p:sp>
     </p:spTree>
     <p:extLst>
       <p:ext uri="{BB962C8B-B14F-4D97-AF65-F5344CB8AC3E}">
@@ -9590,7 +9803,7 @@
 </p:sld>
 </file>
 
-<file path=ppt/slides/slide12.xml><?xml version="1.0" encoding="utf-8"?>
+<file path=ppt/slides/slide13.xml><?xml version="1.0" encoding="utf-8"?>
 <p:sld xmlns:a="http://schemas.openxmlformats.org/drawingml/2006/main" xmlns:r="http://schemas.openxmlformats.org/officeDocument/2006/relationships" xmlns:p="http://schemas.openxmlformats.org/presentationml/2006/main">
   <p:cSld>
     <p:spTree>
@@ -9995,36 +10208,6 @@
           </p:sp>
         </mc:Fallback>
       </mc:AlternateContent>
-      <p:pic>
-        <p:nvPicPr>
-          <p:cNvPr id="140" name="Picture 139">
-            <a:extLst>
-              <a:ext uri="{FF2B5EF4-FFF2-40B4-BE49-F238E27FC236}">
-                <a16:creationId xmlns:a16="http://schemas.microsoft.com/office/drawing/2014/main" id="{1D96B4BB-9FA5-4CD5-9442-ADB285EBA513}"/>
-              </a:ext>
-            </a:extLst>
-          </p:cNvPr>
-          <p:cNvPicPr>
-            <a:picLocks noChangeAspect="1"/>
-          </p:cNvPicPr>
-          <p:nvPr/>
-        </p:nvPicPr>
-        <p:blipFill>
-          <a:blip r:embed="rId2"/>
-          <a:stretch>
-            <a:fillRect/>
-          </a:stretch>
-        </p:blipFill>
-        <p:spPr>
-          <a:xfrm rot="16200000">
-            <a:off x="8366166" y="3554498"/>
-            <a:ext cx="318528" cy="194656"/>
-          </a:xfrm>
-          <a:prstGeom prst="rect">
-            <a:avLst/>
-          </a:prstGeom>
-        </p:spPr>
-      </p:pic>
       <p:sp>
         <p:nvSpPr>
           <p:cNvPr id="142" name="Double Bracket 141">
@@ -10342,66 +10525,6 @@
           </p:sp>
         </mc:Fallback>
       </mc:AlternateContent>
-      <p:pic>
-        <p:nvPicPr>
-          <p:cNvPr id="145" name="Picture 144">
-            <a:extLst>
-              <a:ext uri="{FF2B5EF4-FFF2-40B4-BE49-F238E27FC236}">
-                <a16:creationId xmlns:a16="http://schemas.microsoft.com/office/drawing/2014/main" id="{0C2F3CEF-66A8-4E70-80B3-DC0554661ACF}"/>
-              </a:ext>
-            </a:extLst>
-          </p:cNvPr>
-          <p:cNvPicPr>
-            <a:picLocks noChangeAspect="1"/>
-          </p:cNvPicPr>
-          <p:nvPr/>
-        </p:nvPicPr>
-        <p:blipFill>
-          <a:blip r:embed="rId2"/>
-          <a:stretch>
-            <a:fillRect/>
-          </a:stretch>
-        </p:blipFill>
-        <p:spPr>
-          <a:xfrm rot="16200000">
-            <a:off x="9506794" y="2370809"/>
-            <a:ext cx="318528" cy="194656"/>
-          </a:xfrm>
-          <a:prstGeom prst="rect">
-            <a:avLst/>
-          </a:prstGeom>
-        </p:spPr>
-      </p:pic>
-      <p:pic>
-        <p:nvPicPr>
-          <p:cNvPr id="146" name="Picture 145">
-            <a:extLst>
-              <a:ext uri="{FF2B5EF4-FFF2-40B4-BE49-F238E27FC236}">
-                <a16:creationId xmlns:a16="http://schemas.microsoft.com/office/drawing/2014/main" id="{ABD58757-2F40-40C4-B5CD-3D4D1C7C30BB}"/>
-              </a:ext>
-            </a:extLst>
-          </p:cNvPr>
-          <p:cNvPicPr>
-            <a:picLocks noChangeAspect="1"/>
-          </p:cNvPicPr>
-          <p:nvPr/>
-        </p:nvPicPr>
-        <p:blipFill>
-          <a:blip r:embed="rId2"/>
-          <a:stretch>
-            <a:fillRect/>
-          </a:stretch>
-        </p:blipFill>
-        <p:spPr>
-          <a:xfrm rot="16200000">
-            <a:off x="9518746" y="4982956"/>
-            <a:ext cx="318528" cy="194656"/>
-          </a:xfrm>
-          <a:prstGeom prst="rect">
-            <a:avLst/>
-          </a:prstGeom>
-        </p:spPr>
-      </p:pic>
       <mc:AlternateContent xmlns:mc="http://schemas.openxmlformats.org/markup-compatibility/2006" xmlns:a14="http://schemas.microsoft.com/office/drawing/2010/main">
         <mc:Choice Requires="a14">
           <p:sp>
@@ -11239,36 +11362,6 @@
           </a:p>
         </p:txBody>
       </p:sp>
-      <p:pic>
-        <p:nvPicPr>
-          <p:cNvPr id="158" name="Picture 157">
-            <a:extLst>
-              <a:ext uri="{FF2B5EF4-FFF2-40B4-BE49-F238E27FC236}">
-                <a16:creationId xmlns:a16="http://schemas.microsoft.com/office/drawing/2014/main" id="{8B3BFEDF-0927-48EE-A009-3809C9693686}"/>
-              </a:ext>
-            </a:extLst>
-          </p:cNvPr>
-          <p:cNvPicPr>
-            <a:picLocks noChangeAspect="1"/>
-          </p:cNvPicPr>
-          <p:nvPr/>
-        </p:nvPicPr>
-        <p:blipFill>
-          <a:blip r:embed="rId2"/>
-          <a:stretch>
-            <a:fillRect/>
-          </a:stretch>
-        </p:blipFill>
-        <p:spPr>
-          <a:xfrm rot="16200000">
-            <a:off x="11369166" y="2365829"/>
-            <a:ext cx="318528" cy="194656"/>
-          </a:xfrm>
-          <a:prstGeom prst="rect">
-            <a:avLst/>
-          </a:prstGeom>
-        </p:spPr>
-      </p:pic>
       <p:sp>
         <p:nvSpPr>
           <p:cNvPr id="159" name="TextBox 158">
@@ -11343,36 +11436,6 @@
           </a:p>
         </p:txBody>
       </p:sp>
-      <p:pic>
-        <p:nvPicPr>
-          <p:cNvPr id="161" name="Picture 160">
-            <a:extLst>
-              <a:ext uri="{FF2B5EF4-FFF2-40B4-BE49-F238E27FC236}">
-                <a16:creationId xmlns:a16="http://schemas.microsoft.com/office/drawing/2014/main" id="{904A6F94-FD61-4570-9D4E-F215FB178DC0}"/>
-              </a:ext>
-            </a:extLst>
-          </p:cNvPr>
-          <p:cNvPicPr>
-            <a:picLocks noChangeAspect="1"/>
-          </p:cNvPicPr>
-          <p:nvPr/>
-        </p:nvPicPr>
-        <p:blipFill>
-          <a:blip r:embed="rId2"/>
-          <a:stretch>
-            <a:fillRect/>
-          </a:stretch>
-        </p:blipFill>
-        <p:spPr>
-          <a:xfrm rot="16200000">
-            <a:off x="10773420" y="2361708"/>
-            <a:ext cx="318528" cy="194656"/>
-          </a:xfrm>
-          <a:prstGeom prst="rect">
-            <a:avLst/>
-          </a:prstGeom>
-        </p:spPr>
-      </p:pic>
       <p:sp>
         <p:nvSpPr>
           <p:cNvPr id="162" name="Rectangle 161">
@@ -11664,36 +11727,6 @@
           </a:p>
         </p:txBody>
       </p:sp>
-      <p:pic>
-        <p:nvPicPr>
-          <p:cNvPr id="168" name="Picture 167">
-            <a:extLst>
-              <a:ext uri="{FF2B5EF4-FFF2-40B4-BE49-F238E27FC236}">
-                <a16:creationId xmlns:a16="http://schemas.microsoft.com/office/drawing/2014/main" id="{991CA92F-32A1-47D9-BAEB-3A73A5E466E6}"/>
-              </a:ext>
-            </a:extLst>
-          </p:cNvPr>
-          <p:cNvPicPr>
-            <a:picLocks noChangeAspect="1"/>
-          </p:cNvPicPr>
-          <p:nvPr/>
-        </p:nvPicPr>
-        <p:blipFill>
-          <a:blip r:embed="rId2"/>
-          <a:stretch>
-            <a:fillRect/>
-          </a:stretch>
-        </p:blipFill>
-        <p:spPr>
-          <a:xfrm rot="16200000">
-            <a:off x="11373059" y="5069391"/>
-            <a:ext cx="318528" cy="194656"/>
-          </a:xfrm>
-          <a:prstGeom prst="rect">
-            <a:avLst/>
-          </a:prstGeom>
-        </p:spPr>
-      </p:pic>
       <p:sp>
         <p:nvSpPr>
           <p:cNvPr id="169" name="TextBox 168">
@@ -11766,10 +11799,10 @@
       </p:sp>
       <p:pic>
         <p:nvPicPr>
-          <p:cNvPr id="171" name="Picture 170">
-            <a:extLst>
-              <a:ext uri="{FF2B5EF4-FFF2-40B4-BE49-F238E27FC236}">
-                <a16:creationId xmlns:a16="http://schemas.microsoft.com/office/drawing/2014/main" id="{7F54D0C3-FF97-4DEA-9602-35969807A615}"/>
+          <p:cNvPr id="38" name="Picture 37">
+            <a:extLst>
+              <a:ext uri="{FF2B5EF4-FFF2-40B4-BE49-F238E27FC236}">
+                <a16:creationId xmlns:a16="http://schemas.microsoft.com/office/drawing/2014/main" id="{9D7841F7-471C-41B8-A02A-8D391C40BFD9}"/>
               </a:ext>
             </a:extLst>
           </p:cNvPr>
@@ -11779,7 +11812,127 @@
           <p:nvPr/>
         </p:nvPicPr>
         <p:blipFill>
-          <a:blip r:embed="rId2"/>
+          <a:blip r:embed="rId6"/>
+          <a:stretch>
+            <a:fillRect/>
+          </a:stretch>
+        </p:blipFill>
+        <p:spPr>
+          <a:xfrm rot="16200000">
+            <a:off x="8366166" y="3554498"/>
+            <a:ext cx="318528" cy="194656"/>
+          </a:xfrm>
+          <a:prstGeom prst="rect">
+            <a:avLst/>
+          </a:prstGeom>
+        </p:spPr>
+      </p:pic>
+      <p:pic>
+        <p:nvPicPr>
+          <p:cNvPr id="39" name="Picture 38">
+            <a:extLst>
+              <a:ext uri="{FF2B5EF4-FFF2-40B4-BE49-F238E27FC236}">
+                <a16:creationId xmlns:a16="http://schemas.microsoft.com/office/drawing/2014/main" id="{2FC5DD84-F20C-41CF-9442-8D8F43B567F0}"/>
+              </a:ext>
+            </a:extLst>
+          </p:cNvPr>
+          <p:cNvPicPr>
+            <a:picLocks noChangeAspect="1"/>
+          </p:cNvPicPr>
+          <p:nvPr/>
+        </p:nvPicPr>
+        <p:blipFill>
+          <a:blip r:embed="rId6"/>
+          <a:stretch>
+            <a:fillRect/>
+          </a:stretch>
+        </p:blipFill>
+        <p:spPr>
+          <a:xfrm rot="16200000">
+            <a:off x="9506794" y="2370809"/>
+            <a:ext cx="318528" cy="194656"/>
+          </a:xfrm>
+          <a:prstGeom prst="rect">
+            <a:avLst/>
+          </a:prstGeom>
+        </p:spPr>
+      </p:pic>
+      <p:pic>
+        <p:nvPicPr>
+          <p:cNvPr id="40" name="Picture 39">
+            <a:extLst>
+              <a:ext uri="{FF2B5EF4-FFF2-40B4-BE49-F238E27FC236}">
+                <a16:creationId xmlns:a16="http://schemas.microsoft.com/office/drawing/2014/main" id="{E44F4BB9-7195-4243-83B4-7CFB41E22F63}"/>
+              </a:ext>
+            </a:extLst>
+          </p:cNvPr>
+          <p:cNvPicPr>
+            <a:picLocks noChangeAspect="1"/>
+          </p:cNvPicPr>
+          <p:nvPr/>
+        </p:nvPicPr>
+        <p:blipFill>
+          <a:blip r:embed="rId6"/>
+          <a:stretch>
+            <a:fillRect/>
+          </a:stretch>
+        </p:blipFill>
+        <p:spPr>
+          <a:xfrm rot="16200000">
+            <a:off x="9518746" y="4982956"/>
+            <a:ext cx="318528" cy="194656"/>
+          </a:xfrm>
+          <a:prstGeom prst="rect">
+            <a:avLst/>
+          </a:prstGeom>
+        </p:spPr>
+      </p:pic>
+      <p:pic>
+        <p:nvPicPr>
+          <p:cNvPr id="41" name="Picture 40">
+            <a:extLst>
+              <a:ext uri="{FF2B5EF4-FFF2-40B4-BE49-F238E27FC236}">
+                <a16:creationId xmlns:a16="http://schemas.microsoft.com/office/drawing/2014/main" id="{0EC9C048-19E3-4519-95F8-5625438BF666}"/>
+              </a:ext>
+            </a:extLst>
+          </p:cNvPr>
+          <p:cNvPicPr>
+            <a:picLocks noChangeAspect="1"/>
+          </p:cNvPicPr>
+          <p:nvPr/>
+        </p:nvPicPr>
+        <p:blipFill>
+          <a:blip r:embed="rId6"/>
+          <a:stretch>
+            <a:fillRect/>
+          </a:stretch>
+        </p:blipFill>
+        <p:spPr>
+          <a:xfrm rot="16200000">
+            <a:off x="11369166" y="2365829"/>
+            <a:ext cx="318528" cy="194656"/>
+          </a:xfrm>
+          <a:prstGeom prst="rect">
+            <a:avLst/>
+          </a:prstGeom>
+        </p:spPr>
+      </p:pic>
+      <p:pic>
+        <p:nvPicPr>
+          <p:cNvPr id="42" name="Picture 41">
+            <a:extLst>
+              <a:ext uri="{FF2B5EF4-FFF2-40B4-BE49-F238E27FC236}">
+                <a16:creationId xmlns:a16="http://schemas.microsoft.com/office/drawing/2014/main" id="{3CE5F6B8-08CF-4603-A198-440A47D2A063}"/>
+              </a:ext>
+            </a:extLst>
+          </p:cNvPr>
+          <p:cNvPicPr>
+            <a:picLocks noChangeAspect="1"/>
+          </p:cNvPicPr>
+          <p:nvPr/>
+        </p:nvPicPr>
+        <p:blipFill>
+          <a:blip r:embed="rId6"/>
           <a:stretch>
             <a:fillRect/>
           </a:stretch>
@@ -11794,6 +11947,154 @@
           </a:prstGeom>
         </p:spPr>
       </p:pic>
+      <p:sp>
+        <p:nvSpPr>
+          <p:cNvPr id="43" name="TextBox 42">
+            <a:extLst>
+              <a:ext uri="{FF2B5EF4-FFF2-40B4-BE49-F238E27FC236}">
+                <a16:creationId xmlns:a16="http://schemas.microsoft.com/office/drawing/2014/main" id="{A2C18CC3-4F5B-4CE5-8B46-AD8EBAB4B227}"/>
+              </a:ext>
+            </a:extLst>
+          </p:cNvPr>
+          <p:cNvSpPr txBox="1"/>
+          <p:nvPr/>
+        </p:nvSpPr>
+        <p:spPr>
+          <a:xfrm>
+            <a:off x="11591592" y="2271549"/>
+            <a:ext cx="640976" cy="369332"/>
+          </a:xfrm>
+          <a:prstGeom prst="rect">
+            <a:avLst/>
+          </a:prstGeom>
+          <a:noFill/>
+        </p:spPr>
+        <p:txBody>
+          <a:bodyPr wrap="square" rtlCol="0">
+            <a:spAutoFit/>
+          </a:bodyPr>
+          <a:lstStyle/>
+          <a:p>
+            <a:r>
+              <a:rPr lang="en-US" dirty="0"/>
+              <a:t>c = 1</a:t>
+            </a:r>
+          </a:p>
+        </p:txBody>
+      </p:sp>
+      <p:sp>
+        <p:nvSpPr>
+          <p:cNvPr id="44" name="TextBox 43">
+            <a:extLst>
+              <a:ext uri="{FF2B5EF4-FFF2-40B4-BE49-F238E27FC236}">
+                <a16:creationId xmlns:a16="http://schemas.microsoft.com/office/drawing/2014/main" id="{A837FF46-CB77-489E-936A-79D7E0AF038A}"/>
+              </a:ext>
+            </a:extLst>
+          </p:cNvPr>
+          <p:cNvSpPr txBox="1"/>
+          <p:nvPr/>
+        </p:nvSpPr>
+        <p:spPr>
+          <a:xfrm>
+            <a:off x="11588127" y="4979917"/>
+            <a:ext cx="640976" cy="369332"/>
+          </a:xfrm>
+          <a:prstGeom prst="rect">
+            <a:avLst/>
+          </a:prstGeom>
+          <a:noFill/>
+        </p:spPr>
+        <p:txBody>
+          <a:bodyPr wrap="square" rtlCol="0">
+            <a:spAutoFit/>
+          </a:bodyPr>
+          <a:lstStyle/>
+          <a:p>
+            <a:r>
+              <a:rPr lang="en-US" dirty="0"/>
+              <a:t>c = 2</a:t>
+            </a:r>
+          </a:p>
+        </p:txBody>
+      </p:sp>
+      <p:pic>
+        <p:nvPicPr>
+          <p:cNvPr id="45" name="Picture 44">
+            <a:extLst>
+              <a:ext uri="{FF2B5EF4-FFF2-40B4-BE49-F238E27FC236}">
+                <a16:creationId xmlns:a16="http://schemas.microsoft.com/office/drawing/2014/main" id="{BE0F4E9B-E75C-4CC6-851E-4B3B84CB0A44}"/>
+              </a:ext>
+            </a:extLst>
+          </p:cNvPr>
+          <p:cNvPicPr>
+            <a:picLocks noChangeAspect="1"/>
+          </p:cNvPicPr>
+          <p:nvPr/>
+        </p:nvPicPr>
+        <p:blipFill>
+          <a:blip r:embed="rId6"/>
+          <a:stretch>
+            <a:fillRect/>
+          </a:stretch>
+        </p:blipFill>
+        <p:spPr>
+          <a:xfrm rot="16200000">
+            <a:off x="10773420" y="2361708"/>
+            <a:ext cx="318528" cy="194656"/>
+          </a:xfrm>
+          <a:prstGeom prst="rect">
+            <a:avLst/>
+          </a:prstGeom>
+        </p:spPr>
+      </p:pic>
+      <p:sp>
+        <p:nvSpPr>
+          <p:cNvPr id="46" name="TextBox 45">
+            <a:extLst>
+              <a:ext uri="{FF2B5EF4-FFF2-40B4-BE49-F238E27FC236}">
+                <a16:creationId xmlns:a16="http://schemas.microsoft.com/office/drawing/2014/main" id="{28339E72-42A3-41FE-83BC-0A3859D7C5AF}"/>
+              </a:ext>
+            </a:extLst>
+          </p:cNvPr>
+          <p:cNvSpPr txBox="1"/>
+          <p:nvPr/>
+        </p:nvSpPr>
+        <p:spPr>
+          <a:xfrm>
+            <a:off x="8647490" y="3154275"/>
+            <a:ext cx="2029121" cy="369332"/>
+          </a:xfrm>
+          <a:prstGeom prst="rect">
+            <a:avLst/>
+          </a:prstGeom>
+          <a:noFill/>
+        </p:spPr>
+        <p:txBody>
+          <a:bodyPr wrap="square" rtlCol="0">
+            <a:spAutoFit/>
+          </a:bodyPr>
+          <a:lstStyle/>
+          <a:p>
+            <a:r>
+              <a:rPr lang="en-US" dirty="0">
+                <a:solidFill>
+                  <a:schemeClr val="tx1">
+                    <a:alpha val="20000"/>
+                  </a:schemeClr>
+                </a:solidFill>
+                <a:effectLst>
+                  <a:outerShdw blurRad="50800" dist="50800" dir="5400000" algn="ctr" rotWithShape="0">
+                    <a:srgbClr val="000000">
+                      <a:alpha val="0"/>
+                    </a:srgbClr>
+                  </a:outerShdw>
+                </a:effectLst>
+              </a:rPr>
+              <a:t>aegis4048.github.io</a:t>
+            </a:r>
+          </a:p>
+        </p:txBody>
+      </p:sp>
     </p:spTree>
     <p:extLst>
       <p:ext uri="{BB962C8B-B14F-4D97-AF65-F5344CB8AC3E}">
@@ -11807,7 +12108,7 @@
 </p:sld>
 </file>
 
-<file path=ppt/slides/slide13.xml><?xml version="1.0" encoding="utf-8"?>
+<file path=ppt/slides/slide14.xml><?xml version="1.0" encoding="utf-8"?>
 <p:sld xmlns:a="http://schemas.openxmlformats.org/drawingml/2006/main" xmlns:r="http://schemas.openxmlformats.org/officeDocument/2006/relationships" xmlns:p="http://schemas.openxmlformats.org/presentationml/2006/main">
   <p:cSld>
     <p:spTree>
@@ -12878,7 +13179,7 @@
 </p:sld>
 </file>
 
-<file path=ppt/slides/slide14.xml><?xml version="1.0" encoding="utf-8"?>
+<file path=ppt/slides/slide15.xml><?xml version="1.0" encoding="utf-8"?>
 <p:sld xmlns:a="http://schemas.openxmlformats.org/drawingml/2006/main" xmlns:r="http://schemas.openxmlformats.org/officeDocument/2006/relationships" xmlns:p="http://schemas.openxmlformats.org/presentationml/2006/main">
   <p:cSld>
     <p:spTree>
@@ -13758,7 +14059,7 @@
 </p:sld>
 </file>
 
-<file path=ppt/slides/slide15.xml><?xml version="1.0" encoding="utf-8"?>
+<file path=ppt/slides/slide16.xml><?xml version="1.0" encoding="utf-8"?>
 <p:sld xmlns:a="http://schemas.openxmlformats.org/drawingml/2006/main" xmlns:r="http://schemas.openxmlformats.org/officeDocument/2006/relationships" xmlns:p="http://schemas.openxmlformats.org/presentationml/2006/main">
   <p:cSld>
     <p:spTree>
@@ -14565,7 +14866,7 @@
 </p:sld>
 </file>
 
-<file path=ppt/slides/slide16.xml><?xml version="1.0" encoding="utf-8"?>
+<file path=ppt/slides/slide17.xml><?xml version="1.0" encoding="utf-8"?>
 <p:sld xmlns:a="http://schemas.openxmlformats.org/drawingml/2006/main" xmlns:r="http://schemas.openxmlformats.org/officeDocument/2006/relationships" xmlns:p="http://schemas.openxmlformats.org/presentationml/2006/main">
   <p:cSld>
     <p:spTree>
@@ -16304,7 +16605,7 @@
 </p:sld>
 </file>
 
-<file path=ppt/slides/slide17.xml><?xml version="1.0" encoding="utf-8"?>
+<file path=ppt/slides/slide18.xml><?xml version="1.0" encoding="utf-8"?>
 <p:sld xmlns:a="http://schemas.openxmlformats.org/drawingml/2006/main" xmlns:r="http://schemas.openxmlformats.org/officeDocument/2006/relationships" xmlns:p="http://schemas.openxmlformats.org/presentationml/2006/main">
   <p:cSld>
     <p:spTree>
@@ -17017,7 +17318,7 @@
 </p:sld>
 </file>
 
-<file path=ppt/slides/slide18.xml><?xml version="1.0" encoding="utf-8"?>
+<file path=ppt/slides/slide19.xml><?xml version="1.0" encoding="utf-8"?>
 <p:sld xmlns:a="http://schemas.openxmlformats.org/drawingml/2006/main" xmlns:r="http://schemas.openxmlformats.org/officeDocument/2006/relationships" xmlns:p="http://schemas.openxmlformats.org/presentationml/2006/main">
   <p:cSld>
     <p:spTree>
@@ -21020,6 +21321,76 @@
           </a:p>
         </p:txBody>
       </p:sp>
+      <p:sp>
+        <p:nvSpPr>
+          <p:cNvPr id="6" name="TextBox 5">
+            <a:extLst>
+              <a:ext uri="{FF2B5EF4-FFF2-40B4-BE49-F238E27FC236}">
+                <a16:creationId xmlns:a16="http://schemas.microsoft.com/office/drawing/2014/main" id="{8FAF2905-63F4-43F4-9460-31777981D7B3}"/>
+              </a:ext>
+            </a:extLst>
+          </p:cNvPr>
+          <p:cNvSpPr txBox="1"/>
+          <p:nvPr/>
+        </p:nvSpPr>
+        <p:spPr>
+          <a:xfrm>
+            <a:off x="11591592" y="2271549"/>
+            <a:ext cx="640976" cy="369332"/>
+          </a:xfrm>
+          <a:prstGeom prst="rect">
+            <a:avLst/>
+          </a:prstGeom>
+          <a:noFill/>
+        </p:spPr>
+        <p:txBody>
+          <a:bodyPr wrap="square" rtlCol="0">
+            <a:spAutoFit/>
+          </a:bodyPr>
+          <a:lstStyle/>
+          <a:p>
+            <a:r>
+              <a:rPr lang="en-US" dirty="0"/>
+              <a:t>c = 1</a:t>
+            </a:r>
+          </a:p>
+        </p:txBody>
+      </p:sp>
+      <p:sp>
+        <p:nvSpPr>
+          <p:cNvPr id="71" name="TextBox 70">
+            <a:extLst>
+              <a:ext uri="{FF2B5EF4-FFF2-40B4-BE49-F238E27FC236}">
+                <a16:creationId xmlns:a16="http://schemas.microsoft.com/office/drawing/2014/main" id="{DC41C4DF-07FB-429C-A126-1135696D2606}"/>
+              </a:ext>
+            </a:extLst>
+          </p:cNvPr>
+          <p:cNvSpPr txBox="1"/>
+          <p:nvPr/>
+        </p:nvSpPr>
+        <p:spPr>
+          <a:xfrm>
+            <a:off x="11588127" y="4979917"/>
+            <a:ext cx="640976" cy="369332"/>
+          </a:xfrm>
+          <a:prstGeom prst="rect">
+            <a:avLst/>
+          </a:prstGeom>
+          <a:noFill/>
+        </p:spPr>
+        <p:txBody>
+          <a:bodyPr wrap="square" rtlCol="0">
+            <a:spAutoFit/>
+          </a:bodyPr>
+          <a:lstStyle/>
+          <a:p>
+            <a:r>
+              <a:rPr lang="en-US" dirty="0"/>
+              <a:t>c = 2</a:t>
+            </a:r>
+          </a:p>
+        </p:txBody>
+      </p:sp>
     </p:spTree>
     <p:extLst>
       <p:ext uri="{BB962C8B-B14F-4D97-AF65-F5344CB8AC3E}">
@@ -21033,7 +21404,661 @@
 </p:sld>
 </file>
 
-<file path=ppt/slides/slide19.xml><?xml version="1.0" encoding="utf-8"?>
+<file path=ppt/slides/slide2.xml><?xml version="1.0" encoding="utf-8"?>
+<p:sld xmlns:a="http://schemas.openxmlformats.org/drawingml/2006/main" xmlns:r="http://schemas.openxmlformats.org/officeDocument/2006/relationships" xmlns:p="http://schemas.openxmlformats.org/presentationml/2006/main">
+  <p:cSld>
+    <p:spTree>
+      <p:nvGrpSpPr>
+        <p:cNvPr id="1" name=""/>
+        <p:cNvGrpSpPr/>
+        <p:nvPr/>
+      </p:nvGrpSpPr>
+      <p:grpSpPr>
+        <a:xfrm>
+          <a:off x="0" y="0"/>
+          <a:ext cx="0" cy="0"/>
+          <a:chOff x="0" y="0"/>
+          <a:chExt cx="0" cy="0"/>
+        </a:xfrm>
+      </p:grpSpPr>
+      <p:pic>
+        <p:nvPicPr>
+          <p:cNvPr id="5" name="Picture 4">
+            <a:extLst>
+              <a:ext uri="{FF2B5EF4-FFF2-40B4-BE49-F238E27FC236}">
+                <a16:creationId xmlns:a16="http://schemas.microsoft.com/office/drawing/2014/main" id="{33E3728F-5C5C-403A-B0CD-FA5DC3D1C993}"/>
+              </a:ext>
+            </a:extLst>
+          </p:cNvPr>
+          <p:cNvPicPr>
+            <a:picLocks noChangeAspect="1"/>
+          </p:cNvPicPr>
+          <p:nvPr/>
+        </p:nvPicPr>
+        <p:blipFill>
+          <a:blip r:embed="rId2"/>
+          <a:stretch>
+            <a:fillRect/>
+          </a:stretch>
+        </p:blipFill>
+        <p:spPr>
+          <a:xfrm>
+            <a:off x="3497580" y="2398818"/>
+            <a:ext cx="5196840" cy="2060363"/>
+          </a:xfrm>
+          <a:prstGeom prst="rect">
+            <a:avLst/>
+          </a:prstGeom>
+        </p:spPr>
+      </p:pic>
+      <p:sp>
+        <p:nvSpPr>
+          <p:cNvPr id="6" name="Left Brace 5">
+            <a:extLst>
+              <a:ext uri="{FF2B5EF4-FFF2-40B4-BE49-F238E27FC236}">
+                <a16:creationId xmlns:a16="http://schemas.microsoft.com/office/drawing/2014/main" id="{C015BB06-817A-4921-B3FA-0D297B35C374}"/>
+              </a:ext>
+            </a:extLst>
+          </p:cNvPr>
+          <p:cNvSpPr/>
+          <p:nvPr/>
+        </p:nvSpPr>
+        <p:spPr>
+          <a:xfrm>
+            <a:off x="3103880" y="2438400"/>
+            <a:ext cx="269240" cy="2020781"/>
+          </a:xfrm>
+          <a:prstGeom prst="leftBrace">
+            <a:avLst>
+              <a:gd name="adj1" fmla="val 63050"/>
+              <a:gd name="adj2" fmla="val 50000"/>
+            </a:avLst>
+          </a:prstGeom>
+          <a:ln w="44450">
+            <a:solidFill>
+              <a:schemeClr val="accent2"/>
+            </a:solidFill>
+          </a:ln>
+        </p:spPr>
+        <p:style>
+          <a:lnRef idx="1">
+            <a:schemeClr val="accent1"/>
+          </a:lnRef>
+          <a:fillRef idx="0">
+            <a:schemeClr val="accent1"/>
+          </a:fillRef>
+          <a:effectRef idx="0">
+            <a:schemeClr val="accent1"/>
+          </a:effectRef>
+          <a:fontRef idx="minor">
+            <a:schemeClr val="tx1"/>
+          </a:fontRef>
+        </p:style>
+        <p:txBody>
+          <a:bodyPr rtlCol="0" anchor="ctr"/>
+          <a:lstStyle/>
+          <a:p>
+            <a:pPr algn="ctr"/>
+            <a:endParaRPr lang="en-US"/>
+          </a:p>
+        </p:txBody>
+      </p:sp>
+      <mc:AlternateContent xmlns:mc="http://schemas.openxmlformats.org/markup-compatibility/2006">
+        <mc:Choice xmlns:a14="http://schemas.microsoft.com/office/drawing/2010/main" Requires="a14">
+          <p:sp>
+            <p:nvSpPr>
+              <p:cNvPr id="9" name="TextBox 8">
+                <a:extLst>
+                  <a:ext uri="{FF2B5EF4-FFF2-40B4-BE49-F238E27FC236}">
+                    <a16:creationId xmlns:a16="http://schemas.microsoft.com/office/drawing/2014/main" id="{D460F307-6380-42B7-A02D-F9804704A8B4}"/>
+                  </a:ext>
+                </a:extLst>
+              </p:cNvPr>
+              <p:cNvSpPr txBox="1"/>
+              <p:nvPr/>
+            </p:nvSpPr>
+            <p:spPr>
+              <a:xfrm>
+                <a:off x="828585" y="3105834"/>
+                <a:ext cx="1975575" cy="646331"/>
+              </a:xfrm>
+              <a:prstGeom prst="rect">
+                <a:avLst/>
+              </a:prstGeom>
+              <a:noFill/>
+            </p:spPr>
+            <p:txBody>
+              <a:bodyPr wrap="square" rtlCol="0">
+                <a:spAutoFit/>
+              </a:bodyPr>
+              <a:lstStyle/>
+              <a:p>
+                <a:pPr algn="r"/>
+                <a:r>
+                  <a:rPr lang="en-US" b="1" dirty="0">
+                    <a:solidFill>
+                      <a:schemeClr val="accent2"/>
+                    </a:solidFill>
+                  </a:rPr>
+                  <a:t>Computed </a:t>
+                </a:r>
+                <a14:m>
+                  <m:oMath xmlns:m="http://schemas.openxmlformats.org/officeDocument/2006/math">
+                    <m:r>
+                      <a:rPr lang="en-US" b="1" i="1" smtClean="0">
+                        <a:solidFill>
+                          <a:schemeClr val="accent2"/>
+                        </a:solidFill>
+                        <a:latin typeface="Cambria Math" panose="02040503050406030204" pitchFamily="18" charset="0"/>
+                      </a:rPr>
+                      <m:t>𝑽</m:t>
+                    </m:r>
+                  </m:oMath>
+                </a14:m>
+                <a:r>
+                  <a:rPr lang="en-US" b="1" dirty="0">
+                    <a:solidFill>
+                      <a:schemeClr val="accent2"/>
+                    </a:solidFill>
+                  </a:rPr>
+                  <a:t> times</a:t>
+                </a:r>
+              </a:p>
+              <a:p>
+                <a:pPr algn="r"/>
+                <a:r>
+                  <a:rPr lang="en-US" b="1" dirty="0">
+                    <a:solidFill>
+                      <a:schemeClr val="accent2"/>
+                    </a:solidFill>
+                  </a:rPr>
+                  <a:t>for all vocabs</a:t>
+                </a:r>
+              </a:p>
+            </p:txBody>
+          </p:sp>
+        </mc:Choice>
+        <mc:Fallback>
+          <p:sp>
+            <p:nvSpPr>
+              <p:cNvPr id="9" name="TextBox 8">
+                <a:extLst>
+                  <a:ext uri="{FF2B5EF4-FFF2-40B4-BE49-F238E27FC236}">
+                    <a16:creationId xmlns:a16="http://schemas.microsoft.com/office/drawing/2014/main" id="{D460F307-6380-42B7-A02D-F9804704A8B4}"/>
+                  </a:ext>
+                </a:extLst>
+              </p:cNvPr>
+              <p:cNvSpPr txBox="1">
+                <a:spLocks noRot="1" noChangeAspect="1" noMove="1" noResize="1" noEditPoints="1" noAdjustHandles="1" noChangeArrowheads="1" noChangeShapeType="1" noTextEdit="1"/>
+              </p:cNvSpPr>
+              <p:nvPr/>
+            </p:nvSpPr>
+            <p:spPr>
+              <a:xfrm>
+                <a:off x="828585" y="3105834"/>
+                <a:ext cx="1975575" cy="646331"/>
+              </a:xfrm>
+              <a:prstGeom prst="rect">
+                <a:avLst/>
+              </a:prstGeom>
+              <a:blipFill>
+                <a:blip r:embed="rId3"/>
+                <a:stretch>
+                  <a:fillRect l="-1543" t="-4673" r="-2469" b="-13084"/>
+                </a:stretch>
+              </a:blipFill>
+            </p:spPr>
+            <p:txBody>
+              <a:bodyPr/>
+              <a:lstStyle/>
+              <a:p>
+                <a:r>
+                  <a:rPr lang="en-US">
+                    <a:noFill/>
+                  </a:rPr>
+                  <a:t> </a:t>
+                </a:r>
+              </a:p>
+            </p:txBody>
+          </p:sp>
+        </mc:Fallback>
+      </mc:AlternateContent>
+      <p:sp>
+        <p:nvSpPr>
+          <p:cNvPr id="10" name="Rectangle 9">
+            <a:extLst>
+              <a:ext uri="{FF2B5EF4-FFF2-40B4-BE49-F238E27FC236}">
+                <a16:creationId xmlns:a16="http://schemas.microsoft.com/office/drawing/2014/main" id="{403F7937-C3E8-424C-A54B-7764342D3D36}"/>
+              </a:ext>
+            </a:extLst>
+          </p:cNvPr>
+          <p:cNvSpPr/>
+          <p:nvPr/>
+        </p:nvSpPr>
+        <p:spPr>
+          <a:xfrm>
+            <a:off x="5397832" y="3474191"/>
+            <a:ext cx="2613327" cy="478050"/>
+          </a:xfrm>
+          <a:prstGeom prst="rect">
+            <a:avLst/>
+          </a:prstGeom>
+          <a:noFill/>
+          <a:ln w="44450">
+            <a:solidFill>
+              <a:schemeClr val="accent6"/>
+            </a:solidFill>
+          </a:ln>
+        </p:spPr>
+        <p:style>
+          <a:lnRef idx="2">
+            <a:schemeClr val="accent1">
+              <a:shade val="50000"/>
+            </a:schemeClr>
+          </a:lnRef>
+          <a:fillRef idx="1">
+            <a:schemeClr val="accent1"/>
+          </a:fillRef>
+          <a:effectRef idx="0">
+            <a:schemeClr val="accent1"/>
+          </a:effectRef>
+          <a:fontRef idx="minor">
+            <a:schemeClr val="lt1"/>
+          </a:fontRef>
+        </p:style>
+        <p:txBody>
+          <a:bodyPr rtlCol="0" anchor="ctr"/>
+          <a:lstStyle/>
+          <a:p>
+            <a:pPr algn="ctr"/>
+            <a:endParaRPr lang="en-US"/>
+          </a:p>
+        </p:txBody>
+      </p:sp>
+      <p:cxnSp>
+        <p:nvCxnSpPr>
+          <p:cNvPr id="11" name="Straight Connector 10">
+            <a:extLst>
+              <a:ext uri="{FF2B5EF4-FFF2-40B4-BE49-F238E27FC236}">
+                <a16:creationId xmlns:a16="http://schemas.microsoft.com/office/drawing/2014/main" id="{70A40F80-5559-43FA-8A8B-F8FE06B98087}"/>
+              </a:ext>
+            </a:extLst>
+          </p:cNvPr>
+          <p:cNvCxnSpPr>
+            <a:cxnSpLocks/>
+            <a:endCxn id="10" idx="2"/>
+          </p:cNvCxnSpPr>
+          <p:nvPr/>
+        </p:nvCxnSpPr>
+        <p:spPr>
+          <a:xfrm flipH="1" flipV="1">
+            <a:off x="6704496" y="3952241"/>
+            <a:ext cx="1093304" cy="478050"/>
+          </a:xfrm>
+          <a:prstGeom prst="line">
+            <a:avLst/>
+          </a:prstGeom>
+          <a:ln w="44450">
+            <a:solidFill>
+              <a:schemeClr val="accent6"/>
+            </a:solidFill>
+            <a:headEnd type="triangle"/>
+          </a:ln>
+        </p:spPr>
+        <p:style>
+          <a:lnRef idx="1">
+            <a:schemeClr val="accent1"/>
+          </a:lnRef>
+          <a:fillRef idx="0">
+            <a:schemeClr val="accent1"/>
+          </a:fillRef>
+          <a:effectRef idx="0">
+            <a:schemeClr val="accent1"/>
+          </a:effectRef>
+          <a:fontRef idx="minor">
+            <a:schemeClr val="tx1"/>
+          </a:fontRef>
+        </p:style>
+      </p:cxnSp>
+      <mc:AlternateContent xmlns:mc="http://schemas.openxmlformats.org/markup-compatibility/2006">
+        <mc:Choice xmlns:a14="http://schemas.microsoft.com/office/drawing/2010/main" Requires="a14">
+          <p:sp>
+            <p:nvSpPr>
+              <p:cNvPr id="12" name="TextBox 11">
+                <a:extLst>
+                  <a:ext uri="{FF2B5EF4-FFF2-40B4-BE49-F238E27FC236}">
+                    <a16:creationId xmlns:a16="http://schemas.microsoft.com/office/drawing/2014/main" id="{F9C948D0-7067-489A-BE73-F54E342CF6D7}"/>
+                  </a:ext>
+                </a:extLst>
+              </p:cNvPr>
+              <p:cNvSpPr txBox="1"/>
+              <p:nvPr/>
+            </p:nvSpPr>
+            <p:spPr>
+              <a:xfrm>
+                <a:off x="7940367" y="4107125"/>
+                <a:ext cx="3159433" cy="646331"/>
+              </a:xfrm>
+              <a:prstGeom prst="rect">
+                <a:avLst/>
+              </a:prstGeom>
+              <a:noFill/>
+            </p:spPr>
+            <p:txBody>
+              <a:bodyPr wrap="square" rtlCol="0">
+                <a:spAutoFit/>
+              </a:bodyPr>
+              <a:lstStyle/>
+              <a:p>
+                <a14:m>
+                  <m:oMath xmlns:m="http://schemas.openxmlformats.org/officeDocument/2006/math">
+                    <m:r>
+                      <a:rPr lang="en-US" b="1" i="1" smtClean="0">
+                        <a:solidFill>
+                          <a:schemeClr val="accent6"/>
+                        </a:solidFill>
+                        <a:latin typeface="Cambria Math" panose="02040503050406030204" pitchFamily="18" charset="0"/>
+                      </a:rPr>
+                      <m:t>𝑽</m:t>
+                    </m:r>
+                  </m:oMath>
+                </a14:m>
+                <a:r>
+                  <a:rPr lang="en-US" b="1" dirty="0">
+                    <a:solidFill>
+                      <a:schemeClr val="accent6"/>
+                    </a:solidFill>
+                  </a:rPr>
+                  <a:t> computations are needed to get normalization factor</a:t>
+                </a:r>
+              </a:p>
+            </p:txBody>
+          </p:sp>
+        </mc:Choice>
+        <mc:Fallback>
+          <p:sp>
+            <p:nvSpPr>
+              <p:cNvPr id="12" name="TextBox 11">
+                <a:extLst>
+                  <a:ext uri="{FF2B5EF4-FFF2-40B4-BE49-F238E27FC236}">
+                    <a16:creationId xmlns:a16="http://schemas.microsoft.com/office/drawing/2014/main" id="{F9C948D0-7067-489A-BE73-F54E342CF6D7}"/>
+                  </a:ext>
+                </a:extLst>
+              </p:cNvPr>
+              <p:cNvSpPr txBox="1">
+                <a:spLocks noRot="1" noChangeAspect="1" noMove="1" noResize="1" noEditPoints="1" noAdjustHandles="1" noChangeArrowheads="1" noChangeShapeType="1" noTextEdit="1"/>
+              </p:cNvSpPr>
+              <p:nvPr/>
+            </p:nvSpPr>
+            <p:spPr>
+              <a:xfrm>
+                <a:off x="7940367" y="4107125"/>
+                <a:ext cx="3159433" cy="646331"/>
+              </a:xfrm>
+              <a:prstGeom prst="rect">
+                <a:avLst/>
+              </a:prstGeom>
+              <a:blipFill>
+                <a:blip r:embed="rId4"/>
+                <a:stretch>
+                  <a:fillRect l="-1737" t="-5660" b="-14151"/>
+                </a:stretch>
+              </a:blipFill>
+            </p:spPr>
+            <p:txBody>
+              <a:bodyPr/>
+              <a:lstStyle/>
+              <a:p>
+                <a:r>
+                  <a:rPr lang="en-US">
+                    <a:noFill/>
+                  </a:rPr>
+                  <a:t> </a:t>
+                </a:r>
+              </a:p>
+            </p:txBody>
+          </p:sp>
+        </mc:Fallback>
+      </mc:AlternateContent>
+      <mc:AlternateContent xmlns:mc="http://schemas.openxmlformats.org/markup-compatibility/2006">
+        <mc:Choice xmlns:a14="http://schemas.microsoft.com/office/drawing/2010/main" Requires="a14">
+          <p:sp>
+            <p:nvSpPr>
+              <p:cNvPr id="18" name="TextBox 17">
+                <a:extLst>
+                  <a:ext uri="{FF2B5EF4-FFF2-40B4-BE49-F238E27FC236}">
+                    <a16:creationId xmlns:a16="http://schemas.microsoft.com/office/drawing/2014/main" id="{1236184B-B7CA-4CA0-92E5-576A690433D4}"/>
+                  </a:ext>
+                </a:extLst>
+              </p:cNvPr>
+              <p:cNvSpPr txBox="1"/>
+              <p:nvPr/>
+            </p:nvSpPr>
+            <p:spPr>
+              <a:xfrm>
+                <a:off x="6704495" y="1983319"/>
+                <a:ext cx="4318000" cy="830997"/>
+              </a:xfrm>
+              <a:prstGeom prst="rect">
+                <a:avLst/>
+              </a:prstGeom>
+              <a:noFill/>
+            </p:spPr>
+            <p:txBody>
+              <a:bodyPr wrap="square" rtlCol="0">
+                <a:spAutoFit/>
+              </a:bodyPr>
+              <a:lstStyle/>
+              <a:p>
+                <a:pPr algn="r"/>
+                <a:r>
+                  <a:rPr lang="en-US" sz="2400" b="1" dirty="0">
+                    <a:solidFill>
+                      <a:schemeClr val="accent5"/>
+                    </a:solidFill>
+                  </a:rPr>
+                  <a:t>Complexity = </a:t>
+                </a:r>
+                <a14:m>
+                  <m:oMath xmlns:m="http://schemas.openxmlformats.org/officeDocument/2006/math">
+                    <m:r>
+                      <a:rPr lang="en-US" sz="2400" b="1" i="1" smtClean="0">
+                        <a:solidFill>
+                          <a:schemeClr val="accent5"/>
+                        </a:solidFill>
+                        <a:latin typeface="Cambria Math" panose="02040503050406030204" pitchFamily="18" charset="0"/>
+                      </a:rPr>
+                      <m:t>𝑶</m:t>
+                    </m:r>
+                    <m:d>
+                      <m:dPr>
+                        <m:ctrlPr>
+                          <a:rPr lang="en-US" sz="2400" b="1" i="1" smtClean="0">
+                            <a:solidFill>
+                              <a:schemeClr val="accent5"/>
+                            </a:solidFill>
+                            <a:latin typeface="Cambria Math" panose="02040503050406030204" pitchFamily="18" charset="0"/>
+                          </a:rPr>
+                        </m:ctrlPr>
+                      </m:dPr>
+                      <m:e>
+                        <m:r>
+                          <a:rPr lang="en-US" sz="2400" b="1" i="1" smtClean="0">
+                            <a:solidFill>
+                              <a:schemeClr val="accent5"/>
+                            </a:solidFill>
+                            <a:latin typeface="Cambria Math" panose="02040503050406030204" pitchFamily="18" charset="0"/>
+                          </a:rPr>
+                          <m:t>𝑽</m:t>
+                        </m:r>
+                        <m:r>
+                          <a:rPr lang="en-US" sz="2400" b="1" i="1" smtClean="0">
+                            <a:solidFill>
+                              <a:schemeClr val="accent5"/>
+                            </a:solidFill>
+                            <a:latin typeface="Cambria Math" panose="02040503050406030204" pitchFamily="18" charset="0"/>
+                          </a:rPr>
+                          <m:t>+</m:t>
+                        </m:r>
+                        <m:r>
+                          <a:rPr lang="en-US" sz="2400" b="1" i="1" smtClean="0">
+                            <a:solidFill>
+                              <a:schemeClr val="accent5"/>
+                            </a:solidFill>
+                            <a:latin typeface="Cambria Math" panose="02040503050406030204" pitchFamily="18" charset="0"/>
+                          </a:rPr>
+                          <m:t>𝑽</m:t>
+                        </m:r>
+                      </m:e>
+                    </m:d>
+                    <m:r>
+                      <a:rPr lang="en-US" sz="2400" b="1" i="1">
+                        <a:solidFill>
+                          <a:schemeClr val="accent5"/>
+                        </a:solidFill>
+                        <a:latin typeface="Cambria Math" panose="02040503050406030204" pitchFamily="18" charset="0"/>
+                        <a:ea typeface="Cambria Math" panose="02040503050406030204" pitchFamily="18" charset="0"/>
+                      </a:rPr>
+                      <m:t>≈</m:t>
+                    </m:r>
+                    <m:r>
+                      <a:rPr lang="en-US" sz="2400" b="1" i="1" smtClean="0">
+                        <a:solidFill>
+                          <a:schemeClr val="accent5"/>
+                        </a:solidFill>
+                        <a:latin typeface="Cambria Math" panose="02040503050406030204" pitchFamily="18" charset="0"/>
+                        <a:ea typeface="Cambria Math" panose="02040503050406030204" pitchFamily="18" charset="0"/>
+                      </a:rPr>
+                      <m:t>𝑶</m:t>
+                    </m:r>
+                    <m:d>
+                      <m:dPr>
+                        <m:ctrlPr>
+                          <a:rPr lang="en-US" sz="2400" b="1" i="1" smtClean="0">
+                            <a:solidFill>
+                              <a:schemeClr val="accent5"/>
+                            </a:solidFill>
+                            <a:latin typeface="Cambria Math" panose="02040503050406030204" pitchFamily="18" charset="0"/>
+                            <a:ea typeface="Cambria Math" panose="02040503050406030204" pitchFamily="18" charset="0"/>
+                          </a:rPr>
+                        </m:ctrlPr>
+                      </m:dPr>
+                      <m:e>
+                        <m:r>
+                          <a:rPr lang="en-US" sz="2400" b="1" i="1" smtClean="0">
+                            <a:solidFill>
+                              <a:schemeClr val="accent5"/>
+                            </a:solidFill>
+                            <a:latin typeface="Cambria Math" panose="02040503050406030204" pitchFamily="18" charset="0"/>
+                            <a:ea typeface="Cambria Math" panose="02040503050406030204" pitchFamily="18" charset="0"/>
+                          </a:rPr>
+                          <m:t>𝑽</m:t>
+                        </m:r>
+                      </m:e>
+                    </m:d>
+                  </m:oMath>
+                </a14:m>
+                <a:endParaRPr lang="en-US" sz="2400" b="1" dirty="0">
+                  <a:solidFill>
+                    <a:schemeClr val="accent5"/>
+                  </a:solidFill>
+                  <a:ea typeface="Cambria Math" panose="02040503050406030204" pitchFamily="18" charset="0"/>
+                </a:endParaRPr>
+              </a:p>
+              <a:p>
+                <a:pPr algn="r"/>
+                <a:r>
+                  <a:rPr lang="en-US" sz="2400" b="1" dirty="0">
+                    <a:solidFill>
+                      <a:schemeClr val="accent5"/>
+                    </a:solidFill>
+                  </a:rPr>
+                  <a:t>where </a:t>
+                </a:r>
+                <a14:m>
+                  <m:oMath xmlns:m="http://schemas.openxmlformats.org/officeDocument/2006/math">
+                    <m:r>
+                      <a:rPr lang="en-US" sz="2400" b="1" i="1">
+                        <a:solidFill>
+                          <a:schemeClr val="accent5"/>
+                        </a:solidFill>
+                        <a:latin typeface="Cambria Math" panose="02040503050406030204" pitchFamily="18" charset="0"/>
+                      </a:rPr>
+                      <m:t>𝑽</m:t>
+                    </m:r>
+                  </m:oMath>
+                </a14:m>
+                <a:r>
+                  <a:rPr lang="en-US" sz="2400" b="1" dirty="0">
+                    <a:solidFill>
+                      <a:schemeClr val="accent5"/>
+                    </a:solidFill>
+                  </a:rPr>
+                  <a:t> is very large</a:t>
+                </a:r>
+              </a:p>
+            </p:txBody>
+          </p:sp>
+        </mc:Choice>
+        <mc:Fallback>
+          <p:sp>
+            <p:nvSpPr>
+              <p:cNvPr id="18" name="TextBox 17">
+                <a:extLst>
+                  <a:ext uri="{FF2B5EF4-FFF2-40B4-BE49-F238E27FC236}">
+                    <a16:creationId xmlns:a16="http://schemas.microsoft.com/office/drawing/2014/main" id="{1236184B-B7CA-4CA0-92E5-576A690433D4}"/>
+                  </a:ext>
+                </a:extLst>
+              </p:cNvPr>
+              <p:cNvSpPr txBox="1">
+                <a:spLocks noRot="1" noChangeAspect="1" noMove="1" noResize="1" noEditPoints="1" noAdjustHandles="1" noChangeArrowheads="1" noChangeShapeType="1" noTextEdit="1"/>
+              </p:cNvSpPr>
+              <p:nvPr/>
+            </p:nvSpPr>
+            <p:spPr>
+              <a:xfrm>
+                <a:off x="6704495" y="1983319"/>
+                <a:ext cx="4318000" cy="830997"/>
+              </a:xfrm>
+              <a:prstGeom prst="rect">
+                <a:avLst/>
+              </a:prstGeom>
+              <a:blipFill>
+                <a:blip r:embed="rId5"/>
+                <a:stretch>
+                  <a:fillRect t="-5839" r="-2119" b="-15328"/>
+                </a:stretch>
+              </a:blipFill>
+            </p:spPr>
+            <p:txBody>
+              <a:bodyPr/>
+              <a:lstStyle/>
+              <a:p>
+                <a:r>
+                  <a:rPr lang="en-US">
+                    <a:noFill/>
+                  </a:rPr>
+                  <a:t> </a:t>
+                </a:r>
+              </a:p>
+            </p:txBody>
+          </p:sp>
+        </mc:Fallback>
+      </mc:AlternateContent>
+    </p:spTree>
+    <p:extLst>
+      <p:ext uri="{BB962C8B-B14F-4D97-AF65-F5344CB8AC3E}">
+        <p14:creationId xmlns:p14="http://schemas.microsoft.com/office/powerpoint/2010/main" val="4119168822"/>
+      </p:ext>
+    </p:extLst>
+  </p:cSld>
+  <p:clrMapOvr>
+    <a:masterClrMapping/>
+  </p:clrMapOvr>
+</p:sld>
+</file>
+
+<file path=ppt/slides/slide20.xml><?xml version="1.0" encoding="utf-8"?>
 <p:sld xmlns:a="http://schemas.openxmlformats.org/drawingml/2006/main" xmlns:r="http://schemas.openxmlformats.org/officeDocument/2006/relationships" xmlns:p="http://schemas.openxmlformats.org/presentationml/2006/main">
   <p:cSld>
     <p:spTree>
@@ -22460,144 +23485,7 @@
 </p:sld>
 </file>
 
-<file path=ppt/slides/slide2.xml><?xml version="1.0" encoding="utf-8"?>
-<p:sld xmlns:a="http://schemas.openxmlformats.org/drawingml/2006/main" xmlns:r="http://schemas.openxmlformats.org/officeDocument/2006/relationships" xmlns:p="http://schemas.openxmlformats.org/presentationml/2006/main">
-  <p:cSld>
-    <p:spTree>
-      <p:nvGrpSpPr>
-        <p:cNvPr id="1" name=""/>
-        <p:cNvGrpSpPr/>
-        <p:nvPr/>
-      </p:nvGrpSpPr>
-      <p:grpSpPr>
-        <a:xfrm>
-          <a:off x="0" y="0"/>
-          <a:ext cx="0" cy="0"/>
-          <a:chOff x="0" y="0"/>
-          <a:chExt cx="0" cy="0"/>
-        </a:xfrm>
-      </p:grpSpPr>
-      <p:sp>
-        <p:nvSpPr>
-          <p:cNvPr id="12" name="Rectangle 11">
-            <a:extLst>
-              <a:ext uri="{FF2B5EF4-FFF2-40B4-BE49-F238E27FC236}">
-                <a16:creationId xmlns:a16="http://schemas.microsoft.com/office/drawing/2014/main" id="{23ADB67E-7116-48E7-A675-99D608BF44F6}"/>
-              </a:ext>
-            </a:extLst>
-          </p:cNvPr>
-          <p:cNvSpPr/>
-          <p:nvPr/>
-        </p:nvSpPr>
-        <p:spPr>
-          <a:xfrm>
-            <a:off x="253828" y="914400"/>
-            <a:ext cx="11380959" cy="4391025"/>
-          </a:xfrm>
-          <a:prstGeom prst="rect">
-            <a:avLst/>
-          </a:prstGeom>
-          <a:noFill/>
-        </p:spPr>
-        <p:style>
-          <a:lnRef idx="2">
-            <a:schemeClr val="accent1">
-              <a:shade val="50000"/>
-            </a:schemeClr>
-          </a:lnRef>
-          <a:fillRef idx="1">
-            <a:schemeClr val="accent1"/>
-          </a:fillRef>
-          <a:effectRef idx="0">
-            <a:schemeClr val="accent1"/>
-          </a:effectRef>
-          <a:fontRef idx="minor">
-            <a:schemeClr val="lt1"/>
-          </a:fontRef>
-        </p:style>
-        <p:txBody>
-          <a:bodyPr rtlCol="0" anchor="ctr"/>
-          <a:lstStyle/>
-          <a:p>
-            <a:pPr algn="ctr"/>
-            <a:endParaRPr lang="en-US"/>
-          </a:p>
-        </p:txBody>
-      </p:sp>
-      <p:pic>
-        <p:nvPicPr>
-          <p:cNvPr id="13" name="Picture 12">
-            <a:extLst>
-              <a:ext uri="{FF2B5EF4-FFF2-40B4-BE49-F238E27FC236}">
-                <a16:creationId xmlns:a16="http://schemas.microsoft.com/office/drawing/2014/main" id="{894C426C-E1D4-428E-9121-D278A66248B4}"/>
-              </a:ext>
-            </a:extLst>
-          </p:cNvPr>
-          <p:cNvPicPr>
-            <a:picLocks noChangeAspect="1"/>
-          </p:cNvPicPr>
-          <p:nvPr/>
-        </p:nvPicPr>
-        <p:blipFill>
-          <a:blip r:embed="rId2"/>
-          <a:stretch>
-            <a:fillRect/>
-          </a:stretch>
-        </p:blipFill>
-        <p:spPr>
-          <a:xfrm>
-            <a:off x="1864518" y="1020804"/>
-            <a:ext cx="8462963" cy="350796"/>
-          </a:xfrm>
-          <a:prstGeom prst="rect">
-            <a:avLst/>
-          </a:prstGeom>
-        </p:spPr>
-      </p:pic>
-      <p:pic>
-        <p:nvPicPr>
-          <p:cNvPr id="14" name="Picture 13">
-            <a:extLst>
-              <a:ext uri="{FF2B5EF4-FFF2-40B4-BE49-F238E27FC236}">
-                <a16:creationId xmlns:a16="http://schemas.microsoft.com/office/drawing/2014/main" id="{45A18C7A-1A19-4670-91BC-B422CC8D4DB5}"/>
-              </a:ext>
-            </a:extLst>
-          </p:cNvPr>
-          <p:cNvPicPr>
-            <a:picLocks noChangeAspect="1"/>
-          </p:cNvPicPr>
-          <p:nvPr/>
-        </p:nvPicPr>
-        <p:blipFill>
-          <a:blip r:embed="rId3"/>
-          <a:stretch>
-            <a:fillRect/>
-          </a:stretch>
-        </p:blipFill>
-        <p:spPr>
-          <a:xfrm>
-            <a:off x="1401984" y="1828800"/>
-            <a:ext cx="9084645" cy="3200400"/>
-          </a:xfrm>
-          <a:prstGeom prst="rect">
-            <a:avLst/>
-          </a:prstGeom>
-        </p:spPr>
-      </p:pic>
-    </p:spTree>
-    <p:extLst>
-      <p:ext uri="{BB962C8B-B14F-4D97-AF65-F5344CB8AC3E}">
-        <p14:creationId xmlns:p14="http://schemas.microsoft.com/office/powerpoint/2010/main" val="412385174"/>
-      </p:ext>
-    </p:extLst>
-  </p:cSld>
-  <p:clrMapOvr>
-    <a:masterClrMapping/>
-  </p:clrMapOvr>
-</p:sld>
-</file>
-
-<file path=ppt/slides/slide20.xml><?xml version="1.0" encoding="utf-8"?>
+<file path=ppt/slides/slide21.xml><?xml version="1.0" encoding="utf-8"?>
 <p:sld xmlns:a="http://schemas.openxmlformats.org/drawingml/2006/main" xmlns:r="http://schemas.openxmlformats.org/officeDocument/2006/relationships" xmlns:p="http://schemas.openxmlformats.org/presentationml/2006/main">
   <p:cSld>
     <p:spTree>
@@ -25486,7 +26374,7 @@
 </p:sld>
 </file>
 
-<file path=ppt/slides/slide21.xml><?xml version="1.0" encoding="utf-8"?>
+<file path=ppt/slides/slide22.xml><?xml version="1.0" encoding="utf-8"?>
 <p:sld xmlns:a="http://schemas.openxmlformats.org/drawingml/2006/main" xmlns:r="http://schemas.openxmlformats.org/officeDocument/2006/relationships" xmlns:p="http://schemas.openxmlformats.org/presentationml/2006/main">
   <p:cSld>
     <p:spTree>
@@ -25587,7 +26475,7 @@
 </p:sld>
 </file>
 
-<file path=ppt/slides/slide22.xml><?xml version="1.0" encoding="utf-8"?>
+<file path=ppt/slides/slide23.xml><?xml version="1.0" encoding="utf-8"?>
 <p:sld xmlns:a="http://schemas.openxmlformats.org/drawingml/2006/main" xmlns:r="http://schemas.openxmlformats.org/officeDocument/2006/relationships" xmlns:p="http://schemas.openxmlformats.org/presentationml/2006/main">
   <p:cSld>
     <p:spTree>
@@ -26253,6 +27141,54 @@
           </a:fontRef>
         </p:style>
       </p:cxnSp>
+      <p:sp>
+        <p:nvSpPr>
+          <p:cNvPr id="18" name="TextBox 17">
+            <a:extLst>
+              <a:ext uri="{FF2B5EF4-FFF2-40B4-BE49-F238E27FC236}">
+                <a16:creationId xmlns:a16="http://schemas.microsoft.com/office/drawing/2014/main" id="{D9762EB1-7786-42D5-B4CA-000F71AE9AE6}"/>
+              </a:ext>
+            </a:extLst>
+          </p:cNvPr>
+          <p:cNvSpPr txBox="1"/>
+          <p:nvPr/>
+        </p:nvSpPr>
+        <p:spPr>
+          <a:xfrm>
+            <a:off x="5338238" y="2813129"/>
+            <a:ext cx="2029121" cy="369332"/>
+          </a:xfrm>
+          <a:prstGeom prst="rect">
+            <a:avLst/>
+          </a:prstGeom>
+          <a:noFill/>
+        </p:spPr>
+        <p:txBody>
+          <a:bodyPr wrap="square" rtlCol="0">
+            <a:spAutoFit/>
+          </a:bodyPr>
+          <a:lstStyle/>
+          <a:p>
+            <a:r>
+              <a:rPr lang="en-US" dirty="0">
+                <a:solidFill>
+                  <a:schemeClr val="tx1">
+                    <a:alpha val="20000"/>
+                  </a:schemeClr>
+                </a:solidFill>
+                <a:effectLst>
+                  <a:outerShdw blurRad="50800" dist="50800" dir="5400000" algn="ctr" rotWithShape="0">
+                    <a:srgbClr val="000000">
+                      <a:alpha val="0"/>
+                    </a:srgbClr>
+                  </a:outerShdw>
+                </a:effectLst>
+              </a:rPr>
+              <a:t>aegis4048.github.io</a:t>
+            </a:r>
+          </a:p>
+        </p:txBody>
+      </p:sp>
     </p:spTree>
     <p:extLst>
       <p:ext uri="{BB962C8B-B14F-4D97-AF65-F5344CB8AC3E}">
@@ -26266,7 +27202,7 @@
 </p:sld>
 </file>
 
-<file path=ppt/slides/slide23.xml><?xml version="1.0" encoding="utf-8"?>
+<file path=ppt/slides/slide24.xml><?xml version="1.0" encoding="utf-8"?>
 <p:sld xmlns:a="http://schemas.openxmlformats.org/drawingml/2006/main" xmlns:r="http://schemas.openxmlformats.org/officeDocument/2006/relationships" xmlns:p="http://schemas.openxmlformats.org/presentationml/2006/main">
   <p:cSld>
     <p:spTree>
@@ -26835,6 +27771,54 @@
           </a:fontRef>
         </p:style>
       </p:cxnSp>
+      <p:sp>
+        <p:nvSpPr>
+          <p:cNvPr id="14" name="TextBox 13">
+            <a:extLst>
+              <a:ext uri="{FF2B5EF4-FFF2-40B4-BE49-F238E27FC236}">
+                <a16:creationId xmlns:a16="http://schemas.microsoft.com/office/drawing/2014/main" id="{8754EACE-E326-443D-A238-6F0C0CF8D84D}"/>
+              </a:ext>
+            </a:extLst>
+          </p:cNvPr>
+          <p:cNvSpPr txBox="1"/>
+          <p:nvPr/>
+        </p:nvSpPr>
+        <p:spPr>
+          <a:xfrm>
+            <a:off x="6005132" y="4968288"/>
+            <a:ext cx="2029121" cy="369332"/>
+          </a:xfrm>
+          <a:prstGeom prst="rect">
+            <a:avLst/>
+          </a:prstGeom>
+          <a:noFill/>
+        </p:spPr>
+        <p:txBody>
+          <a:bodyPr wrap="square" rtlCol="0">
+            <a:spAutoFit/>
+          </a:bodyPr>
+          <a:lstStyle/>
+          <a:p>
+            <a:r>
+              <a:rPr lang="en-US" dirty="0">
+                <a:solidFill>
+                  <a:schemeClr val="tx1">
+                    <a:alpha val="20000"/>
+                  </a:schemeClr>
+                </a:solidFill>
+                <a:effectLst>
+                  <a:outerShdw blurRad="50800" dist="50800" dir="5400000" algn="ctr" rotWithShape="0">
+                    <a:srgbClr val="000000">
+                      <a:alpha val="0"/>
+                    </a:srgbClr>
+                  </a:outerShdw>
+                </a:effectLst>
+              </a:rPr>
+              <a:t>aegis4048.github.io</a:t>
+            </a:r>
+          </a:p>
+        </p:txBody>
+      </p:sp>
     </p:spTree>
     <p:extLst>
       <p:ext uri="{BB962C8B-B14F-4D97-AF65-F5344CB8AC3E}">
@@ -26848,7 +27832,7 @@
 </p:sld>
 </file>
 
-<file path=ppt/slides/slide24.xml><?xml version="1.0" encoding="utf-8"?>
+<file path=ppt/slides/slide25.xml><?xml version="1.0" encoding="utf-8"?>
 <p:sld xmlns:a="http://schemas.openxmlformats.org/drawingml/2006/main" xmlns:r="http://schemas.openxmlformats.org/officeDocument/2006/relationships" xmlns:p="http://schemas.openxmlformats.org/presentationml/2006/main">
   <p:cSld>
     <p:spTree>
@@ -27417,6 +28401,54 @@
           </a:fontRef>
         </p:style>
       </p:cxnSp>
+      <p:sp>
+        <p:nvSpPr>
+          <p:cNvPr id="14" name="TextBox 13">
+            <a:extLst>
+              <a:ext uri="{FF2B5EF4-FFF2-40B4-BE49-F238E27FC236}">
+                <a16:creationId xmlns:a16="http://schemas.microsoft.com/office/drawing/2014/main" id="{F3E7D299-461A-4293-B416-D43DBE16F619}"/>
+              </a:ext>
+            </a:extLst>
+          </p:cNvPr>
+          <p:cNvSpPr txBox="1"/>
+          <p:nvPr/>
+        </p:nvSpPr>
+        <p:spPr>
+          <a:xfrm>
+            <a:off x="6005132" y="4968288"/>
+            <a:ext cx="2029121" cy="369332"/>
+          </a:xfrm>
+          <a:prstGeom prst="rect">
+            <a:avLst/>
+          </a:prstGeom>
+          <a:noFill/>
+        </p:spPr>
+        <p:txBody>
+          <a:bodyPr wrap="square" rtlCol="0">
+            <a:spAutoFit/>
+          </a:bodyPr>
+          <a:lstStyle/>
+          <a:p>
+            <a:r>
+              <a:rPr lang="en-US" dirty="0">
+                <a:solidFill>
+                  <a:schemeClr val="tx1">
+                    <a:alpha val="20000"/>
+                  </a:schemeClr>
+                </a:solidFill>
+                <a:effectLst>
+                  <a:outerShdw blurRad="50800" dist="50800" dir="5400000" algn="ctr" rotWithShape="0">
+                    <a:srgbClr val="000000">
+                      <a:alpha val="0"/>
+                    </a:srgbClr>
+                  </a:outerShdw>
+                </a:effectLst>
+              </a:rPr>
+              <a:t>aegis4048.github.io</a:t>
+            </a:r>
+          </a:p>
+        </p:txBody>
+      </p:sp>
     </p:spTree>
     <p:extLst>
       <p:ext uri="{BB962C8B-B14F-4D97-AF65-F5344CB8AC3E}">
@@ -27430,7 +28462,7 @@
 </p:sld>
 </file>
 
-<file path=ppt/slides/slide25.xml><?xml version="1.0" encoding="utf-8"?>
+<file path=ppt/slides/slide26.xml><?xml version="1.0" encoding="utf-8"?>
 <p:sld xmlns:a="http://schemas.openxmlformats.org/drawingml/2006/main" xmlns:r="http://schemas.openxmlformats.org/officeDocument/2006/relationships" xmlns:p="http://schemas.openxmlformats.org/presentationml/2006/main">
   <p:cSld>
     <p:spTree>
@@ -28697,7 +29729,7 @@
 </p:sld>
 </file>
 
-<file path=ppt/slides/slide26.xml><?xml version="1.0" encoding="utf-8"?>
+<file path=ppt/slides/slide27.xml><?xml version="1.0" encoding="utf-8"?>
 <p:sld xmlns:a="http://schemas.openxmlformats.org/drawingml/2006/main" xmlns:r="http://schemas.openxmlformats.org/officeDocument/2006/relationships" xmlns:p="http://schemas.openxmlformats.org/presentationml/2006/main">
   <p:cSld>
     <p:spTree>
@@ -29679,7 +30711,7 @@
 </p:sld>
 </file>
 
-<file path=ppt/slides/slide27.xml><?xml version="1.0" encoding="utf-8"?>
+<file path=ppt/slides/slide28.xml><?xml version="1.0" encoding="utf-8"?>
 <p:sld xmlns:a="http://schemas.openxmlformats.org/drawingml/2006/main" xmlns:r="http://schemas.openxmlformats.org/officeDocument/2006/relationships" xmlns:p="http://schemas.openxmlformats.org/presentationml/2006/main">
   <p:cSld>
     <p:spTree>
@@ -33899,7 +34931,7 @@
 </p:sld>
 </file>
 
-<file path=ppt/slides/slide28.xml><?xml version="1.0" encoding="utf-8"?>
+<file path=ppt/slides/slide29.xml><?xml version="1.0" encoding="utf-8"?>
 <p:sld xmlns:a="http://schemas.openxmlformats.org/drawingml/2006/main" xmlns:r="http://schemas.openxmlformats.org/officeDocument/2006/relationships" xmlns:p="http://schemas.openxmlformats.org/presentationml/2006/main">
   <p:cSld>
     <p:spTree>
@@ -37540,7 +38572,192 @@
 </p:sld>
 </file>
 
-<file path=ppt/slides/slide29.xml><?xml version="1.0" encoding="utf-8"?>
+<file path=ppt/slides/slide3.xml><?xml version="1.0" encoding="utf-8"?>
+<p:sld xmlns:a="http://schemas.openxmlformats.org/drawingml/2006/main" xmlns:r="http://schemas.openxmlformats.org/officeDocument/2006/relationships" xmlns:p="http://schemas.openxmlformats.org/presentationml/2006/main">
+  <p:cSld>
+    <p:spTree>
+      <p:nvGrpSpPr>
+        <p:cNvPr id="1" name=""/>
+        <p:cNvGrpSpPr/>
+        <p:nvPr/>
+      </p:nvGrpSpPr>
+      <p:grpSpPr>
+        <a:xfrm>
+          <a:off x="0" y="0"/>
+          <a:ext cx="0" cy="0"/>
+          <a:chOff x="0" y="0"/>
+          <a:chExt cx="0" cy="0"/>
+        </a:xfrm>
+      </p:grpSpPr>
+      <p:sp>
+        <p:nvSpPr>
+          <p:cNvPr id="12" name="Rectangle 11">
+            <a:extLst>
+              <a:ext uri="{FF2B5EF4-FFF2-40B4-BE49-F238E27FC236}">
+                <a16:creationId xmlns:a16="http://schemas.microsoft.com/office/drawing/2014/main" id="{23ADB67E-7116-48E7-A675-99D608BF44F6}"/>
+              </a:ext>
+            </a:extLst>
+          </p:cNvPr>
+          <p:cNvSpPr/>
+          <p:nvPr/>
+        </p:nvSpPr>
+        <p:spPr>
+          <a:xfrm>
+            <a:off x="253828" y="914400"/>
+            <a:ext cx="11380959" cy="4391025"/>
+          </a:xfrm>
+          <a:prstGeom prst="rect">
+            <a:avLst/>
+          </a:prstGeom>
+          <a:noFill/>
+        </p:spPr>
+        <p:style>
+          <a:lnRef idx="2">
+            <a:schemeClr val="accent1">
+              <a:shade val="50000"/>
+            </a:schemeClr>
+          </a:lnRef>
+          <a:fillRef idx="1">
+            <a:schemeClr val="accent1"/>
+          </a:fillRef>
+          <a:effectRef idx="0">
+            <a:schemeClr val="accent1"/>
+          </a:effectRef>
+          <a:fontRef idx="minor">
+            <a:schemeClr val="lt1"/>
+          </a:fontRef>
+        </p:style>
+        <p:txBody>
+          <a:bodyPr rtlCol="0" anchor="ctr"/>
+          <a:lstStyle/>
+          <a:p>
+            <a:pPr algn="ctr"/>
+            <a:endParaRPr lang="en-US"/>
+          </a:p>
+        </p:txBody>
+      </p:sp>
+      <p:pic>
+        <p:nvPicPr>
+          <p:cNvPr id="13" name="Picture 12">
+            <a:extLst>
+              <a:ext uri="{FF2B5EF4-FFF2-40B4-BE49-F238E27FC236}">
+                <a16:creationId xmlns:a16="http://schemas.microsoft.com/office/drawing/2014/main" id="{894C426C-E1D4-428E-9121-D278A66248B4}"/>
+              </a:ext>
+            </a:extLst>
+          </p:cNvPr>
+          <p:cNvPicPr>
+            <a:picLocks noChangeAspect="1"/>
+          </p:cNvPicPr>
+          <p:nvPr/>
+        </p:nvPicPr>
+        <p:blipFill>
+          <a:blip r:embed="rId2"/>
+          <a:stretch>
+            <a:fillRect/>
+          </a:stretch>
+        </p:blipFill>
+        <p:spPr>
+          <a:xfrm>
+            <a:off x="1864518" y="1020804"/>
+            <a:ext cx="8462963" cy="350796"/>
+          </a:xfrm>
+          <a:prstGeom prst="rect">
+            <a:avLst/>
+          </a:prstGeom>
+        </p:spPr>
+      </p:pic>
+      <p:pic>
+        <p:nvPicPr>
+          <p:cNvPr id="2" name="Picture 1">
+            <a:extLst>
+              <a:ext uri="{FF2B5EF4-FFF2-40B4-BE49-F238E27FC236}">
+                <a16:creationId xmlns:a16="http://schemas.microsoft.com/office/drawing/2014/main" id="{3B682D55-191E-439B-AF59-B22EDECED8D9}"/>
+              </a:ext>
+            </a:extLst>
+          </p:cNvPr>
+          <p:cNvPicPr>
+            <a:picLocks noChangeAspect="1"/>
+          </p:cNvPicPr>
+          <p:nvPr/>
+        </p:nvPicPr>
+        <p:blipFill>
+          <a:blip r:embed="rId3"/>
+          <a:stretch>
+            <a:fillRect/>
+          </a:stretch>
+        </p:blipFill>
+        <p:spPr>
+          <a:xfrm>
+            <a:off x="2047621" y="2011680"/>
+            <a:ext cx="8096755" cy="2834640"/>
+          </a:xfrm>
+          <a:prstGeom prst="rect">
+            <a:avLst/>
+          </a:prstGeom>
+        </p:spPr>
+      </p:pic>
+      <p:sp>
+        <p:nvSpPr>
+          <p:cNvPr id="5" name="TextBox 4">
+            <a:extLst>
+              <a:ext uri="{FF2B5EF4-FFF2-40B4-BE49-F238E27FC236}">
+                <a16:creationId xmlns:a16="http://schemas.microsoft.com/office/drawing/2014/main" id="{7733E6A0-18A0-4F3F-9211-C46AA4A6A553}"/>
+              </a:ext>
+            </a:extLst>
+          </p:cNvPr>
+          <p:cNvSpPr txBox="1"/>
+          <p:nvPr/>
+        </p:nvSpPr>
+        <p:spPr>
+          <a:xfrm>
+            <a:off x="5558472" y="3504374"/>
+            <a:ext cx="2029121" cy="369332"/>
+          </a:xfrm>
+          <a:prstGeom prst="rect">
+            <a:avLst/>
+          </a:prstGeom>
+          <a:noFill/>
+        </p:spPr>
+        <p:txBody>
+          <a:bodyPr wrap="square" rtlCol="0">
+            <a:spAutoFit/>
+          </a:bodyPr>
+          <a:lstStyle/>
+          <a:p>
+            <a:r>
+              <a:rPr lang="en-US" dirty="0">
+                <a:solidFill>
+                  <a:schemeClr val="tx1">
+                    <a:alpha val="20000"/>
+                  </a:schemeClr>
+                </a:solidFill>
+                <a:effectLst>
+                  <a:outerShdw blurRad="50800" dist="50800" dir="5400000" algn="ctr" rotWithShape="0">
+                    <a:srgbClr val="000000">
+                      <a:alpha val="0"/>
+                    </a:srgbClr>
+                  </a:outerShdw>
+                </a:effectLst>
+              </a:rPr>
+              <a:t>aegis4048.github.io</a:t>
+            </a:r>
+          </a:p>
+        </p:txBody>
+      </p:sp>
+    </p:spTree>
+    <p:extLst>
+      <p:ext uri="{BB962C8B-B14F-4D97-AF65-F5344CB8AC3E}">
+        <p14:creationId xmlns:p14="http://schemas.microsoft.com/office/powerpoint/2010/main" val="412385174"/>
+      </p:ext>
+    </p:extLst>
+  </p:cSld>
+  <p:clrMapOvr>
+    <a:masterClrMapping/>
+  </p:clrMapOvr>
+</p:sld>
+</file>
+
+<file path=ppt/slides/slide30.xml><?xml version="1.0" encoding="utf-8"?>
 <p:sld xmlns:a="http://schemas.openxmlformats.org/drawingml/2006/main" xmlns:r="http://schemas.openxmlformats.org/officeDocument/2006/relationships" xmlns:p="http://schemas.openxmlformats.org/presentationml/2006/main">
   <p:cSld>
     <p:bg>
@@ -39164,114 +40381,7 @@
 </p:sld>
 </file>
 
-<file path=ppt/slides/slide3.xml><?xml version="1.0" encoding="utf-8"?>
-<p:sld xmlns:a="http://schemas.openxmlformats.org/drawingml/2006/main" xmlns:r="http://schemas.openxmlformats.org/officeDocument/2006/relationships" xmlns:p="http://schemas.openxmlformats.org/presentationml/2006/main">
-  <p:cSld>
-    <p:spTree>
-      <p:nvGrpSpPr>
-        <p:cNvPr id="1" name=""/>
-        <p:cNvGrpSpPr/>
-        <p:nvPr/>
-      </p:nvGrpSpPr>
-      <p:grpSpPr>
-        <a:xfrm>
-          <a:off x="0" y="0"/>
-          <a:ext cx="0" cy="0"/>
-          <a:chOff x="0" y="0"/>
-          <a:chExt cx="0" cy="0"/>
-        </a:xfrm>
-      </p:grpSpPr>
-      <p:sp>
-        <p:nvSpPr>
-          <p:cNvPr id="5" name="Rectangle 4">
-            <a:extLst>
-              <a:ext uri="{FF2B5EF4-FFF2-40B4-BE49-F238E27FC236}">
-                <a16:creationId xmlns:a16="http://schemas.microsoft.com/office/drawing/2014/main" id="{4AFABD5C-E230-4091-B401-713D170FD526}"/>
-              </a:ext>
-            </a:extLst>
-          </p:cNvPr>
-          <p:cNvSpPr/>
-          <p:nvPr/>
-        </p:nvSpPr>
-        <p:spPr>
-          <a:xfrm>
-            <a:off x="253828" y="1855720"/>
-            <a:ext cx="11380959" cy="3449705"/>
-          </a:xfrm>
-          <a:prstGeom prst="rect">
-            <a:avLst/>
-          </a:prstGeom>
-          <a:noFill/>
-        </p:spPr>
-        <p:style>
-          <a:lnRef idx="2">
-            <a:schemeClr val="accent1">
-              <a:shade val="50000"/>
-            </a:schemeClr>
-          </a:lnRef>
-          <a:fillRef idx="1">
-            <a:schemeClr val="accent1"/>
-          </a:fillRef>
-          <a:effectRef idx="0">
-            <a:schemeClr val="accent1"/>
-          </a:effectRef>
-          <a:fontRef idx="minor">
-            <a:schemeClr val="lt1"/>
-          </a:fontRef>
-        </p:style>
-        <p:txBody>
-          <a:bodyPr rtlCol="0" anchor="ctr"/>
-          <a:lstStyle/>
-          <a:p>
-            <a:pPr algn="ctr"/>
-            <a:endParaRPr lang="en-US"/>
-          </a:p>
-        </p:txBody>
-      </p:sp>
-      <p:pic>
-        <p:nvPicPr>
-          <p:cNvPr id="9" name="Picture 8">
-            <a:extLst>
-              <a:ext uri="{FF2B5EF4-FFF2-40B4-BE49-F238E27FC236}">
-                <a16:creationId xmlns:a16="http://schemas.microsoft.com/office/drawing/2014/main" id="{6940D211-D4EE-4624-8A6A-373FC55AD51A}"/>
-              </a:ext>
-            </a:extLst>
-          </p:cNvPr>
-          <p:cNvPicPr>
-            <a:picLocks noChangeAspect="1"/>
-          </p:cNvPicPr>
-          <p:nvPr/>
-        </p:nvPicPr>
-        <p:blipFill>
-          <a:blip r:embed="rId2"/>
-          <a:stretch>
-            <a:fillRect/>
-          </a:stretch>
-        </p:blipFill>
-        <p:spPr>
-          <a:xfrm>
-            <a:off x="1794904" y="1888932"/>
-            <a:ext cx="8298806" cy="3383280"/>
-          </a:xfrm>
-          <a:prstGeom prst="rect">
-            <a:avLst/>
-          </a:prstGeom>
-        </p:spPr>
-      </p:pic>
-    </p:spTree>
-    <p:extLst>
-      <p:ext uri="{BB962C8B-B14F-4D97-AF65-F5344CB8AC3E}">
-        <p14:creationId xmlns:p14="http://schemas.microsoft.com/office/powerpoint/2010/main" val="1879459574"/>
-      </p:ext>
-    </p:extLst>
-  </p:cSld>
-  <p:clrMapOvr>
-    <a:masterClrMapping/>
-  </p:clrMapOvr>
-</p:sld>
-</file>
-
-<file path=ppt/slides/slide30.xml><?xml version="1.0" encoding="utf-8"?>
+<file path=ppt/slides/slide31.xml><?xml version="1.0" encoding="utf-8"?>
 <p:sld xmlns:a="http://schemas.openxmlformats.org/drawingml/2006/main" xmlns:r="http://schemas.openxmlformats.org/officeDocument/2006/relationships" xmlns:p="http://schemas.openxmlformats.org/presentationml/2006/main">
   <p:cSld>
     <p:spTree>
@@ -39824,7 +40934,7 @@
 </p:sld>
 </file>
 
-<file path=ppt/slides/slide31.xml><?xml version="1.0" encoding="utf-8"?>
+<file path=ppt/slides/slide32.xml><?xml version="1.0" encoding="utf-8"?>
 <p:sld xmlns:a="http://schemas.openxmlformats.org/drawingml/2006/main" xmlns:r="http://schemas.openxmlformats.org/officeDocument/2006/relationships" xmlns:p="http://schemas.openxmlformats.org/presentationml/2006/main">
   <p:cSld>
     <p:spTree>
@@ -41863,7 +42973,7 @@
 </p:sld>
 </file>
 
-<file path=ppt/slides/slide32.xml><?xml version="1.0" encoding="utf-8"?>
+<file path=ppt/slides/slide33.xml><?xml version="1.0" encoding="utf-8"?>
 <p:sld xmlns:a="http://schemas.openxmlformats.org/drawingml/2006/main" xmlns:r="http://schemas.openxmlformats.org/officeDocument/2006/relationships" xmlns:p="http://schemas.openxmlformats.org/presentationml/2006/main">
   <p:cSld>
     <p:spTree>
@@ -47168,7 +48278,7 @@
 </p:sld>
 </file>
 
-<file path=ppt/slides/slide33.xml><?xml version="1.0" encoding="utf-8"?>
+<file path=ppt/slides/slide34.xml><?xml version="1.0" encoding="utf-8"?>
 <p:sld xmlns:a="http://schemas.openxmlformats.org/drawingml/2006/main" xmlns:r="http://schemas.openxmlformats.org/officeDocument/2006/relationships" xmlns:p="http://schemas.openxmlformats.org/presentationml/2006/main">
   <p:cSld>
     <p:spTree>
@@ -48486,7 +49596,7 @@
 </p:sld>
 </file>
 
-<file path=ppt/slides/slide34.xml><?xml version="1.0" encoding="utf-8"?>
+<file path=ppt/slides/slide35.xml><?xml version="1.0" encoding="utf-8"?>
 <p:sld xmlns:a="http://schemas.openxmlformats.org/drawingml/2006/main" xmlns:r="http://schemas.openxmlformats.org/officeDocument/2006/relationships" xmlns:p="http://schemas.openxmlformats.org/presentationml/2006/main">
   <p:cSld>
     <p:spTree>
@@ -49329,7 +50439,7 @@
 </p:sld>
 </file>
 
-<file path=ppt/slides/slide35.xml><?xml version="1.0" encoding="utf-8"?>
+<file path=ppt/slides/slide36.xml><?xml version="1.0" encoding="utf-8"?>
 <p:sld xmlns:a="http://schemas.openxmlformats.org/drawingml/2006/main" xmlns:r="http://schemas.openxmlformats.org/officeDocument/2006/relationships" xmlns:p="http://schemas.openxmlformats.org/presentationml/2006/main">
   <p:cSld>
     <p:spTree>
@@ -50404,7 +51514,7 @@
 </p:sld>
 </file>
 
-<file path=ppt/slides/slide36.xml><?xml version="1.0" encoding="utf-8"?>
+<file path=ppt/slides/slide37.xml><?xml version="1.0" encoding="utf-8"?>
 <p:sld xmlns:a="http://schemas.openxmlformats.org/drawingml/2006/main" xmlns:r="http://schemas.openxmlformats.org/officeDocument/2006/relationships" xmlns:p="http://schemas.openxmlformats.org/presentationml/2006/main">
   <p:cSld>
     <p:spTree>
@@ -50486,7 +51596,7 @@
           <p:cNvPr id="5" name="Rectangle 4">
             <a:extLst>
               <a:ext uri="{FF2B5EF4-FFF2-40B4-BE49-F238E27FC236}">
-                <a16:creationId xmlns:a16="http://schemas.microsoft.com/office/drawing/2014/main" id="{544C5752-F07C-4D42-AFE9-7AC8CCDE8AF7}"/>
+                <a16:creationId xmlns:a16="http://schemas.microsoft.com/office/drawing/2014/main" id="{4AFABD5C-E230-4091-B401-713D170FD526}"/>
               </a:ext>
             </a:extLst>
           </p:cNvPr>
@@ -50495,8 +51605,8 @@
         </p:nvSpPr>
         <p:spPr>
           <a:xfrm>
-            <a:off x="253828" y="1855720"/>
-            <a:ext cx="11380959" cy="3449705"/>
+            <a:off x="253828" y="1652588"/>
+            <a:ext cx="11380959" cy="3843337"/>
           </a:xfrm>
           <a:prstGeom prst="rect">
             <a:avLst/>
@@ -50530,10 +51640,10 @@
       </p:sp>
       <p:pic>
         <p:nvPicPr>
-          <p:cNvPr id="7" name="Picture 6">
-            <a:extLst>
-              <a:ext uri="{FF2B5EF4-FFF2-40B4-BE49-F238E27FC236}">
-                <a16:creationId xmlns:a16="http://schemas.microsoft.com/office/drawing/2014/main" id="{E960F876-CFE3-4E4D-9D22-D7A710129698}"/>
+          <p:cNvPr id="6" name="Picture 5">
+            <a:extLst>
+              <a:ext uri="{FF2B5EF4-FFF2-40B4-BE49-F238E27FC236}">
+                <a16:creationId xmlns:a16="http://schemas.microsoft.com/office/drawing/2014/main" id="{FC403CF1-BF8B-4D12-85A6-0E2CC85B1FC7}"/>
               </a:ext>
             </a:extLst>
           </p:cNvPr>
@@ -50550,18 +51660,66 @@
         </p:blipFill>
         <p:spPr>
           <a:xfrm>
-            <a:off x="461438" y="1980372"/>
-            <a:ext cx="10965738" cy="3200400"/>
+            <a:off x="1648685" y="2065496"/>
+            <a:ext cx="8591244" cy="3017520"/>
           </a:xfrm>
           <a:prstGeom prst="rect">
             <a:avLst/>
           </a:prstGeom>
         </p:spPr>
       </p:pic>
+      <p:sp>
+        <p:nvSpPr>
+          <p:cNvPr id="4" name="TextBox 3">
+            <a:extLst>
+              <a:ext uri="{FF2B5EF4-FFF2-40B4-BE49-F238E27FC236}">
+                <a16:creationId xmlns:a16="http://schemas.microsoft.com/office/drawing/2014/main" id="{8AF0EFB2-5EB3-4254-8E23-F7A5F66EC47A}"/>
+              </a:ext>
+            </a:extLst>
+          </p:cNvPr>
+          <p:cNvSpPr txBox="1"/>
+          <p:nvPr/>
+        </p:nvSpPr>
+        <p:spPr>
+          <a:xfrm>
+            <a:off x="5276084" y="3495409"/>
+            <a:ext cx="2029121" cy="369332"/>
+          </a:xfrm>
+          <a:prstGeom prst="rect">
+            <a:avLst/>
+          </a:prstGeom>
+          <a:noFill/>
+        </p:spPr>
+        <p:txBody>
+          <a:bodyPr wrap="square" rtlCol="0">
+            <a:spAutoFit/>
+          </a:bodyPr>
+          <a:lstStyle/>
+          <a:p>
+            <a:r>
+              <a:rPr lang="en-US" dirty="0">
+                <a:solidFill>
+                  <a:schemeClr val="tx1">
+                    <a:alpha val="20000"/>
+                  </a:schemeClr>
+                </a:solidFill>
+                <a:effectLst>
+                  <a:outerShdw blurRad="50800" dist="50800" dir="5400000" algn="ctr" rotWithShape="0">
+                    <a:srgbClr val="000000">
+                      <a:alpha val="0"/>
+                    </a:srgbClr>
+                  </a:outerShdw>
+                </a:effectLst>
+              </a:rPr>
+              <a:t>aegis4048.github.io</a:t>
+            </a:r>
+          </a:p>
+        </p:txBody>
+      </p:sp>
     </p:spTree>
     <p:extLst>
       <p:ext uri="{BB962C8B-B14F-4D97-AF65-F5344CB8AC3E}">
-        <p14:creationId xmlns:p14="http://schemas.microsoft.com/office/powerpoint/2010/main" val="1434404399"/>
+        <p14:creationId xmlns:p14="http://schemas.microsoft.com/office/powerpoint/2010/main" val="1879459574"/>
       </p:ext>
     </p:extLst>
   </p:cSld>
@@ -50590,10 +51748,10 @@
       </p:grpSpPr>
       <p:sp>
         <p:nvSpPr>
-          <p:cNvPr id="6" name="Rectangle 5">
-            <a:extLst>
-              <a:ext uri="{FF2B5EF4-FFF2-40B4-BE49-F238E27FC236}">
-                <a16:creationId xmlns:a16="http://schemas.microsoft.com/office/drawing/2014/main" id="{0089E516-B456-47D4-929B-7416FC965B51}"/>
+          <p:cNvPr id="5" name="Rectangle 4">
+            <a:extLst>
+              <a:ext uri="{FF2B5EF4-FFF2-40B4-BE49-F238E27FC236}">
+                <a16:creationId xmlns:a16="http://schemas.microsoft.com/office/drawing/2014/main" id="{544C5752-F07C-4D42-AFE9-7AC8CCDE8AF7}"/>
               </a:ext>
             </a:extLst>
           </p:cNvPr>
@@ -50602,8 +51760,8 @@
         </p:nvSpPr>
         <p:spPr>
           <a:xfrm>
-            <a:off x="253828" y="0"/>
-            <a:ext cx="11380959" cy="6858000"/>
+            <a:off x="253828" y="1855720"/>
+            <a:ext cx="11380959" cy="3449705"/>
           </a:xfrm>
           <a:prstGeom prst="rect">
             <a:avLst/>
@@ -50635,91 +51793,184 @@
           </a:p>
         </p:txBody>
       </p:sp>
-      <p:grpSp>
-        <p:nvGrpSpPr>
-          <p:cNvPr id="9" name="Group 8">
-            <a:extLst>
-              <a:ext uri="{FF2B5EF4-FFF2-40B4-BE49-F238E27FC236}">
-                <a16:creationId xmlns:a16="http://schemas.microsoft.com/office/drawing/2014/main" id="{332E3156-2C7E-49C6-A8A0-2E3A25E4E444}"/>
-              </a:ext>
-            </a:extLst>
-          </p:cNvPr>
-          <p:cNvGrpSpPr/>
+      <p:pic>
+        <p:nvPicPr>
+          <p:cNvPr id="2" name="Picture 1">
+            <a:extLst>
+              <a:ext uri="{FF2B5EF4-FFF2-40B4-BE49-F238E27FC236}">
+                <a16:creationId xmlns:a16="http://schemas.microsoft.com/office/drawing/2014/main" id="{0211EAFE-AA75-44BC-A611-0311A660A1A9}"/>
+              </a:ext>
+            </a:extLst>
+          </p:cNvPr>
+          <p:cNvPicPr>
+            <a:picLocks noChangeAspect="1"/>
+          </p:cNvPicPr>
           <p:nvPr/>
-        </p:nvGrpSpPr>
-        <p:grpSpPr>
+        </p:nvPicPr>
+        <p:blipFill>
+          <a:blip r:embed="rId2"/>
+          <a:stretch>
+            <a:fillRect/>
+          </a:stretch>
+        </p:blipFill>
+        <p:spPr>
           <a:xfrm>
-            <a:off x="1963574" y="133129"/>
-            <a:ext cx="8264852" cy="6591742"/>
-            <a:chOff x="2629485" y="52823"/>
-            <a:chExt cx="8264852" cy="6591742"/>
+            <a:off x="414641" y="2151684"/>
+            <a:ext cx="10969798" cy="2834640"/>
           </a:xfrm>
-        </p:grpSpPr>
-        <p:pic>
-          <p:nvPicPr>
-            <p:cNvPr id="7" name="Picture 6">
-              <a:extLst>
-                <a:ext uri="{FF2B5EF4-FFF2-40B4-BE49-F238E27FC236}">
-                  <a16:creationId xmlns:a16="http://schemas.microsoft.com/office/drawing/2014/main" id="{559AF9E1-57A3-42CB-B577-25EAE23D0F7A}"/>
-                </a:ext>
-              </a:extLst>
-            </p:cNvPr>
-            <p:cNvPicPr>
-              <a:picLocks noChangeAspect="1"/>
-            </p:cNvPicPr>
-            <p:nvPr/>
-          </p:nvPicPr>
-          <p:blipFill>
-            <a:blip r:embed="rId2"/>
-            <a:stretch>
-              <a:fillRect/>
-            </a:stretch>
-          </p:blipFill>
-          <p:spPr>
-            <a:xfrm>
-              <a:off x="2629485" y="52823"/>
-              <a:ext cx="6629643" cy="3200400"/>
-            </a:xfrm>
-            <a:prstGeom prst="rect">
-              <a:avLst/>
-            </a:prstGeom>
-          </p:spPr>
-        </p:pic>
-        <p:pic>
-          <p:nvPicPr>
-            <p:cNvPr id="8" name="Picture 7">
-              <a:extLst>
-                <a:ext uri="{FF2B5EF4-FFF2-40B4-BE49-F238E27FC236}">
-                  <a16:creationId xmlns:a16="http://schemas.microsoft.com/office/drawing/2014/main" id="{CA212BA1-D7D1-4507-893A-51ACAD32E982}"/>
-                </a:ext>
-              </a:extLst>
-            </p:cNvPr>
-            <p:cNvPicPr>
-              <a:picLocks noChangeAspect="1"/>
-            </p:cNvPicPr>
-            <p:nvPr/>
-          </p:nvPicPr>
-          <p:blipFill>
-            <a:blip r:embed="rId3"/>
-            <a:stretch>
-              <a:fillRect/>
-            </a:stretch>
-          </p:blipFill>
-          <p:spPr>
-            <a:xfrm>
-              <a:off x="2629485" y="3444165"/>
-              <a:ext cx="8264852" cy="3200400"/>
-            </a:xfrm>
-            <a:prstGeom prst="rect">
-              <a:avLst/>
-            </a:prstGeom>
-          </p:spPr>
-        </p:pic>
-      </p:grpSp>
+          <a:prstGeom prst="rect">
+            <a:avLst/>
+          </a:prstGeom>
+        </p:spPr>
+      </p:pic>
+      <p:sp>
+        <p:nvSpPr>
+          <p:cNvPr id="4" name="TextBox 3">
+            <a:extLst>
+              <a:ext uri="{FF2B5EF4-FFF2-40B4-BE49-F238E27FC236}">
+                <a16:creationId xmlns:a16="http://schemas.microsoft.com/office/drawing/2014/main" id="{CB1C59E0-CAB7-4C10-9642-CFE6CEBD4BAA}"/>
+              </a:ext>
+            </a:extLst>
+          </p:cNvPr>
+          <p:cNvSpPr txBox="1"/>
+          <p:nvPr/>
+        </p:nvSpPr>
+        <p:spPr>
+          <a:xfrm>
+            <a:off x="5800519" y="3580572"/>
+            <a:ext cx="2029121" cy="369332"/>
+          </a:xfrm>
+          <a:prstGeom prst="rect">
+            <a:avLst/>
+          </a:prstGeom>
+          <a:noFill/>
+        </p:spPr>
+        <p:txBody>
+          <a:bodyPr wrap="square" rtlCol="0">
+            <a:spAutoFit/>
+          </a:bodyPr>
+          <a:lstStyle/>
+          <a:p>
+            <a:r>
+              <a:rPr lang="en-US" dirty="0">
+                <a:solidFill>
+                  <a:schemeClr val="tx1">
+                    <a:alpha val="20000"/>
+                  </a:schemeClr>
+                </a:solidFill>
+                <a:effectLst>
+                  <a:outerShdw blurRad="50800" dist="50800" dir="5400000" algn="ctr" rotWithShape="0">
+                    <a:srgbClr val="000000">
+                      <a:alpha val="0"/>
+                    </a:srgbClr>
+                  </a:outerShdw>
+                </a:effectLst>
+              </a:rPr>
+              <a:t>aegis4048.github.io</a:t>
+            </a:r>
+          </a:p>
+        </p:txBody>
+      </p:sp>
+      <p:sp>
+        <p:nvSpPr>
+          <p:cNvPr id="6" name="TextBox 5">
+            <a:extLst>
+              <a:ext uri="{FF2B5EF4-FFF2-40B4-BE49-F238E27FC236}">
+                <a16:creationId xmlns:a16="http://schemas.microsoft.com/office/drawing/2014/main" id="{A49EEF35-30B0-4841-ACE9-A279F8CBAA0F}"/>
+              </a:ext>
+            </a:extLst>
+          </p:cNvPr>
+          <p:cNvSpPr txBox="1"/>
+          <p:nvPr/>
+        </p:nvSpPr>
+        <p:spPr>
+          <a:xfrm>
+            <a:off x="892343" y="3569004"/>
+            <a:ext cx="2029121" cy="369332"/>
+          </a:xfrm>
+          <a:prstGeom prst="rect">
+            <a:avLst/>
+          </a:prstGeom>
+          <a:noFill/>
+        </p:spPr>
+        <p:txBody>
+          <a:bodyPr wrap="square" rtlCol="0">
+            <a:spAutoFit/>
+          </a:bodyPr>
+          <a:lstStyle/>
+          <a:p>
+            <a:r>
+              <a:rPr lang="en-US" dirty="0">
+                <a:solidFill>
+                  <a:schemeClr val="tx1">
+                    <a:alpha val="20000"/>
+                  </a:schemeClr>
+                </a:solidFill>
+                <a:effectLst>
+                  <a:outerShdw blurRad="50800" dist="50800" dir="5400000" algn="ctr" rotWithShape="0">
+                    <a:srgbClr val="000000">
+                      <a:alpha val="0"/>
+                    </a:srgbClr>
+                  </a:outerShdw>
+                </a:effectLst>
+              </a:rPr>
+              <a:t>aegis4048.github.io</a:t>
+            </a:r>
+          </a:p>
+        </p:txBody>
+      </p:sp>
+      <p:sp>
+        <p:nvSpPr>
+          <p:cNvPr id="7" name="TextBox 6">
+            <a:extLst>
+              <a:ext uri="{FF2B5EF4-FFF2-40B4-BE49-F238E27FC236}">
+                <a16:creationId xmlns:a16="http://schemas.microsoft.com/office/drawing/2014/main" id="{1C938A27-B0DE-4017-981B-AE09E1AC90AF}"/>
+              </a:ext>
+            </a:extLst>
+          </p:cNvPr>
+          <p:cNvSpPr txBox="1"/>
+          <p:nvPr/>
+        </p:nvSpPr>
+        <p:spPr>
+          <a:xfrm>
+            <a:off x="9018848" y="3569004"/>
+            <a:ext cx="2029121" cy="369332"/>
+          </a:xfrm>
+          <a:prstGeom prst="rect">
+            <a:avLst/>
+          </a:prstGeom>
+          <a:noFill/>
+        </p:spPr>
+        <p:txBody>
+          <a:bodyPr wrap="square" rtlCol="0">
+            <a:spAutoFit/>
+          </a:bodyPr>
+          <a:lstStyle/>
+          <a:p>
+            <a:r>
+              <a:rPr lang="en-US" dirty="0">
+                <a:solidFill>
+                  <a:schemeClr val="tx1">
+                    <a:alpha val="20000"/>
+                  </a:schemeClr>
+                </a:solidFill>
+                <a:effectLst>
+                  <a:outerShdw blurRad="50800" dist="50800" dir="5400000" algn="ctr" rotWithShape="0">
+                    <a:srgbClr val="000000">
+                      <a:alpha val="0"/>
+                    </a:srgbClr>
+                  </a:outerShdw>
+                </a:effectLst>
+              </a:rPr>
+              <a:t>aegis4048.github.io</a:t>
+            </a:r>
+          </a:p>
+        </p:txBody>
+      </p:sp>
     </p:spTree>
     <p:extLst>
       <p:ext uri="{BB962C8B-B14F-4D97-AF65-F5344CB8AC3E}">
-        <p14:creationId xmlns:p14="http://schemas.microsoft.com/office/powerpoint/2010/main" val="3287482236"/>
+        <p14:creationId xmlns:p14="http://schemas.microsoft.com/office/powerpoint/2010/main" val="1434404399"/>
       </p:ext>
     </p:extLst>
   </p:cSld>
@@ -50748,10 +51999,10 @@
       </p:grpSpPr>
       <p:sp>
         <p:nvSpPr>
-          <p:cNvPr id="5" name="Rectangle 4">
-            <a:extLst>
-              <a:ext uri="{FF2B5EF4-FFF2-40B4-BE49-F238E27FC236}">
-                <a16:creationId xmlns:a16="http://schemas.microsoft.com/office/drawing/2014/main" id="{544C5752-F07C-4D42-AFE9-7AC8CCDE8AF7}"/>
+          <p:cNvPr id="6" name="Rectangle 5">
+            <a:extLst>
+              <a:ext uri="{FF2B5EF4-FFF2-40B4-BE49-F238E27FC236}">
+                <a16:creationId xmlns:a16="http://schemas.microsoft.com/office/drawing/2014/main" id="{0089E516-B456-47D4-929B-7416FC965B51}"/>
               </a:ext>
             </a:extLst>
           </p:cNvPr>
@@ -50760,8 +52011,8 @@
         </p:nvSpPr>
         <p:spPr>
           <a:xfrm>
-            <a:off x="253828" y="1855720"/>
-            <a:ext cx="11380959" cy="3449705"/>
+            <a:off x="253828" y="0"/>
+            <a:ext cx="11380959" cy="6858000"/>
           </a:xfrm>
           <a:prstGeom prst="rect">
             <a:avLst/>
@@ -50798,7 +52049,7 @@
           <p:cNvPr id="2" name="Picture 1">
             <a:extLst>
               <a:ext uri="{FF2B5EF4-FFF2-40B4-BE49-F238E27FC236}">
-                <a16:creationId xmlns:a16="http://schemas.microsoft.com/office/drawing/2014/main" id="{D439DC60-ABD4-4F6F-B167-BDF674AB4925}"/>
+                <a16:creationId xmlns:a16="http://schemas.microsoft.com/office/drawing/2014/main" id="{4E6A77AB-6FA5-44D9-A453-F35C1BC5781A}"/>
               </a:ext>
             </a:extLst>
           </p:cNvPr>
@@ -50808,25 +52059,169 @@
           <p:nvPr/>
         </p:nvPicPr>
         <p:blipFill>
-          <a:blip r:embed="rId2"/>
+          <a:blip r:embed="rId3"/>
           <a:stretch>
             <a:fillRect/>
           </a:stretch>
         </p:blipFill>
         <p:spPr>
           <a:xfrm>
-            <a:off x="2566886" y="1980372"/>
-            <a:ext cx="6754842" cy="3200400"/>
+            <a:off x="1893570" y="44988"/>
+            <a:ext cx="8404860" cy="6678376"/>
           </a:xfrm>
           <a:prstGeom prst="rect">
             <a:avLst/>
           </a:prstGeom>
         </p:spPr>
       </p:pic>
+      <p:sp>
+        <p:nvSpPr>
+          <p:cNvPr id="4" name="TextBox 3">
+            <a:extLst>
+              <a:ext uri="{FF2B5EF4-FFF2-40B4-BE49-F238E27FC236}">
+                <a16:creationId xmlns:a16="http://schemas.microsoft.com/office/drawing/2014/main" id="{455018F5-12FE-4256-BD1F-4A828E7AC11B}"/>
+              </a:ext>
+            </a:extLst>
+          </p:cNvPr>
+          <p:cNvSpPr txBox="1"/>
+          <p:nvPr/>
+        </p:nvSpPr>
+        <p:spPr>
+          <a:xfrm>
+            <a:off x="4254107" y="1762393"/>
+            <a:ext cx="2029121" cy="369332"/>
+          </a:xfrm>
+          <a:prstGeom prst="rect">
+            <a:avLst/>
+          </a:prstGeom>
+          <a:noFill/>
+        </p:spPr>
+        <p:txBody>
+          <a:bodyPr wrap="square" rtlCol="0">
+            <a:spAutoFit/>
+          </a:bodyPr>
+          <a:lstStyle/>
+          <a:p>
+            <a:r>
+              <a:rPr lang="en-US" dirty="0">
+                <a:solidFill>
+                  <a:schemeClr val="tx1">
+                    <a:alpha val="20000"/>
+                  </a:schemeClr>
+                </a:solidFill>
+                <a:effectLst>
+                  <a:outerShdw blurRad="50800" dist="50800" dir="5400000" algn="ctr" rotWithShape="0">
+                    <a:srgbClr val="000000">
+                      <a:alpha val="0"/>
+                    </a:srgbClr>
+                  </a:outerShdw>
+                </a:effectLst>
+              </a:rPr>
+              <a:t>aegis4048.github.io</a:t>
+            </a:r>
+          </a:p>
+        </p:txBody>
+      </p:sp>
+      <p:sp>
+        <p:nvSpPr>
+          <p:cNvPr id="5" name="TextBox 4">
+            <a:extLst>
+              <a:ext uri="{FF2B5EF4-FFF2-40B4-BE49-F238E27FC236}">
+                <a16:creationId xmlns:a16="http://schemas.microsoft.com/office/drawing/2014/main" id="{E5298B15-78E5-4533-B258-41A0B95A9FC9}"/>
+              </a:ext>
+            </a:extLst>
+          </p:cNvPr>
+          <p:cNvSpPr txBox="1"/>
+          <p:nvPr/>
+        </p:nvSpPr>
+        <p:spPr>
+          <a:xfrm>
+            <a:off x="7060060" y="5095607"/>
+            <a:ext cx="2029121" cy="369332"/>
+          </a:xfrm>
+          <a:prstGeom prst="rect">
+            <a:avLst/>
+          </a:prstGeom>
+          <a:noFill/>
+        </p:spPr>
+        <p:txBody>
+          <a:bodyPr wrap="square" rtlCol="0">
+            <a:spAutoFit/>
+          </a:bodyPr>
+          <a:lstStyle/>
+          <a:p>
+            <a:r>
+              <a:rPr lang="en-US" dirty="0">
+                <a:solidFill>
+                  <a:schemeClr val="tx1">
+                    <a:alpha val="20000"/>
+                  </a:schemeClr>
+                </a:solidFill>
+                <a:effectLst>
+                  <a:outerShdw blurRad="50800" dist="50800" dir="5400000" algn="ctr" rotWithShape="0">
+                    <a:srgbClr val="000000">
+                      <a:alpha val="0"/>
+                    </a:srgbClr>
+                  </a:outerShdw>
+                </a:effectLst>
+              </a:rPr>
+              <a:t>aegis4048.github.io</a:t>
+            </a:r>
+          </a:p>
+        </p:txBody>
+      </p:sp>
+      <p:sp>
+        <p:nvSpPr>
+          <p:cNvPr id="10" name="TextBox 9">
+            <a:extLst>
+              <a:ext uri="{FF2B5EF4-FFF2-40B4-BE49-F238E27FC236}">
+                <a16:creationId xmlns:a16="http://schemas.microsoft.com/office/drawing/2014/main" id="{98C997A9-776D-4CDB-9BAB-3F52505DD813}"/>
+              </a:ext>
+            </a:extLst>
+          </p:cNvPr>
+          <p:cNvSpPr txBox="1"/>
+          <p:nvPr/>
+        </p:nvSpPr>
+        <p:spPr>
+          <a:xfrm>
+            <a:off x="3496589" y="5095607"/>
+            <a:ext cx="2029121" cy="369332"/>
+          </a:xfrm>
+          <a:prstGeom prst="rect">
+            <a:avLst/>
+          </a:prstGeom>
+          <a:noFill/>
+        </p:spPr>
+        <p:txBody>
+          <a:bodyPr wrap="square" rtlCol="0">
+            <a:spAutoFit/>
+          </a:bodyPr>
+          <a:lstStyle/>
+          <a:p>
+            <a:r>
+              <a:rPr lang="en-US" dirty="0">
+                <a:solidFill>
+                  <a:schemeClr val="tx1">
+                    <a:alpha val="20000"/>
+                  </a:schemeClr>
+                </a:solidFill>
+                <a:effectLst>
+                  <a:outerShdw blurRad="50800" dist="50800" dir="5400000" algn="ctr" rotWithShape="0">
+                    <a:srgbClr val="000000">
+                      <a:alpha val="0"/>
+                    </a:srgbClr>
+                  </a:outerShdw>
+                </a:effectLst>
+              </a:rPr>
+              <a:t>aegis4048.github.io</a:t>
+            </a:r>
+          </a:p>
+        </p:txBody>
+      </p:sp>
     </p:spTree>
     <p:extLst>
       <p:ext uri="{BB962C8B-B14F-4D97-AF65-F5344CB8AC3E}">
-        <p14:creationId xmlns:p14="http://schemas.microsoft.com/office/powerpoint/2010/main" val="2502052677"/>
+        <p14:creationId xmlns:p14="http://schemas.microsoft.com/office/powerpoint/2010/main" val="3287482236"/>
       </p:ext>
     </p:extLst>
   </p:cSld>
@@ -50902,10 +52297,10 @@
       </p:sp>
       <p:pic>
         <p:nvPicPr>
-          <p:cNvPr id="6" name="Picture 5" descr="A screenshot of a cell phone&#10;&#10;Description automatically generated">
-            <a:extLst>
-              <a:ext uri="{FF2B5EF4-FFF2-40B4-BE49-F238E27FC236}">
-                <a16:creationId xmlns:a16="http://schemas.microsoft.com/office/drawing/2014/main" id="{446D0FC4-3985-4CDE-A216-A291E2A3A3C1}"/>
+          <p:cNvPr id="3" name="Picture 2">
+            <a:extLst>
+              <a:ext uri="{FF2B5EF4-FFF2-40B4-BE49-F238E27FC236}">
+                <a16:creationId xmlns:a16="http://schemas.microsoft.com/office/drawing/2014/main" id="{EAFE1ADA-4903-4507-9027-E2BBD3BE5B7B}"/>
               </a:ext>
             </a:extLst>
           </p:cNvPr>
@@ -50915,31 +52310,73 @@
           <p:nvPr/>
         </p:nvPicPr>
         <p:blipFill>
-          <a:blip r:embed="rId2">
-            <a:extLst>
-              <a:ext uri="{28A0092B-C50C-407E-A947-70E740481C1C}">
-                <a14:useLocalDpi xmlns:a14="http://schemas.microsoft.com/office/drawing/2010/main" val="0"/>
-              </a:ext>
-            </a:extLst>
-          </a:blip>
+          <a:blip r:embed="rId2"/>
           <a:stretch>
             <a:fillRect/>
           </a:stretch>
         </p:blipFill>
         <p:spPr>
           <a:xfrm>
-            <a:off x="323850" y="2151653"/>
-            <a:ext cx="10977563" cy="2968862"/>
+            <a:off x="2787015" y="2163252"/>
+            <a:ext cx="6617970" cy="2834640"/>
           </a:xfrm>
           <a:prstGeom prst="rect">
             <a:avLst/>
           </a:prstGeom>
         </p:spPr>
       </p:pic>
+      <p:sp>
+        <p:nvSpPr>
+          <p:cNvPr id="4" name="TextBox 3">
+            <a:extLst>
+              <a:ext uri="{FF2B5EF4-FFF2-40B4-BE49-F238E27FC236}">
+                <a16:creationId xmlns:a16="http://schemas.microsoft.com/office/drawing/2014/main" id="{91096FD0-6C6D-49DC-8A63-3DC6E515AADD}"/>
+              </a:ext>
+            </a:extLst>
+          </p:cNvPr>
+          <p:cNvSpPr txBox="1"/>
+          <p:nvPr/>
+        </p:nvSpPr>
+        <p:spPr>
+          <a:xfrm>
+            <a:off x="5155061" y="3620913"/>
+            <a:ext cx="2029121" cy="369332"/>
+          </a:xfrm>
+          <a:prstGeom prst="rect">
+            <a:avLst/>
+          </a:prstGeom>
+          <a:noFill/>
+        </p:spPr>
+        <p:txBody>
+          <a:bodyPr wrap="square" rtlCol="0">
+            <a:spAutoFit/>
+          </a:bodyPr>
+          <a:lstStyle/>
+          <a:p>
+            <a:r>
+              <a:rPr lang="en-US" dirty="0">
+                <a:solidFill>
+                  <a:schemeClr val="tx1">
+                    <a:alpha val="20000"/>
+                  </a:schemeClr>
+                </a:solidFill>
+                <a:effectLst>
+                  <a:outerShdw blurRad="50800" dist="50800" dir="5400000" algn="ctr" rotWithShape="0">
+                    <a:srgbClr val="000000">
+                      <a:alpha val="0"/>
+                    </a:srgbClr>
+                  </a:outerShdw>
+                </a:effectLst>
+              </a:rPr>
+              <a:t>aegis4048.github.io</a:t>
+            </a:r>
+          </a:p>
+        </p:txBody>
+      </p:sp>
     </p:spTree>
     <p:extLst>
       <p:ext uri="{BB962C8B-B14F-4D97-AF65-F5344CB8AC3E}">
-        <p14:creationId xmlns:p14="http://schemas.microsoft.com/office/powerpoint/2010/main" val="1182496359"/>
+        <p14:creationId xmlns:p14="http://schemas.microsoft.com/office/powerpoint/2010/main" val="2502052677"/>
       </p:ext>
     </p:extLst>
   </p:cSld>
@@ -51015,10 +52452,10 @@
       </p:sp>
       <p:pic>
         <p:nvPicPr>
-          <p:cNvPr id="6" name="Picture 5" descr="A screenshot of a cell phone&#10;&#10;Description automatically generated">
-            <a:extLst>
-              <a:ext uri="{FF2B5EF4-FFF2-40B4-BE49-F238E27FC236}">
-                <a16:creationId xmlns:a16="http://schemas.microsoft.com/office/drawing/2014/main" id="{A9F5DD90-B0B3-460E-AB56-F93DBA619B1E}"/>
+          <p:cNvPr id="3" name="Picture 2" descr="A screenshot of a cell phone&#10;&#10;Description automatically generated">
+            <a:extLst>
+              <a:ext uri="{FF2B5EF4-FFF2-40B4-BE49-F238E27FC236}">
+                <a16:creationId xmlns:a16="http://schemas.microsoft.com/office/drawing/2014/main" id="{F19C1F8E-9A1C-4DF7-8136-E4BFCC90D5C4}"/>
               </a:ext>
             </a:extLst>
           </p:cNvPr>
@@ -51041,18 +52478,162 @@
         </p:blipFill>
         <p:spPr>
           <a:xfrm>
-            <a:off x="507913" y="2110309"/>
-            <a:ext cx="10872788" cy="2940526"/>
+            <a:off x="417237" y="2310041"/>
+            <a:ext cx="11054139" cy="2541061"/>
           </a:xfrm>
           <a:prstGeom prst="rect">
             <a:avLst/>
           </a:prstGeom>
         </p:spPr>
       </p:pic>
+      <p:sp>
+        <p:nvSpPr>
+          <p:cNvPr id="4" name="TextBox 3">
+            <a:extLst>
+              <a:ext uri="{FF2B5EF4-FFF2-40B4-BE49-F238E27FC236}">
+                <a16:creationId xmlns:a16="http://schemas.microsoft.com/office/drawing/2014/main" id="{E1399587-B75B-4CF2-BF7D-B4F28BFEBECC}"/>
+              </a:ext>
+            </a:extLst>
+          </p:cNvPr>
+          <p:cNvSpPr txBox="1"/>
+          <p:nvPr/>
+        </p:nvSpPr>
+        <p:spPr>
+          <a:xfrm>
+            <a:off x="847520" y="3395905"/>
+            <a:ext cx="2029121" cy="369332"/>
+          </a:xfrm>
+          <a:prstGeom prst="rect">
+            <a:avLst/>
+          </a:prstGeom>
+          <a:noFill/>
+        </p:spPr>
+        <p:txBody>
+          <a:bodyPr wrap="square" rtlCol="0">
+            <a:spAutoFit/>
+          </a:bodyPr>
+          <a:lstStyle/>
+          <a:p>
+            <a:r>
+              <a:rPr lang="en-US" dirty="0">
+                <a:solidFill>
+                  <a:schemeClr val="tx1">
+                    <a:alpha val="20000"/>
+                  </a:schemeClr>
+                </a:solidFill>
+                <a:effectLst>
+                  <a:outerShdw blurRad="50800" dist="50800" dir="5400000" algn="ctr" rotWithShape="0">
+                    <a:srgbClr val="000000">
+                      <a:alpha val="0"/>
+                    </a:srgbClr>
+                  </a:outerShdw>
+                </a:effectLst>
+              </a:rPr>
+              <a:t>aegis4048.github.io</a:t>
+            </a:r>
+          </a:p>
+        </p:txBody>
+      </p:sp>
+      <p:sp>
+        <p:nvSpPr>
+          <p:cNvPr id="6" name="TextBox 5">
+            <a:extLst>
+              <a:ext uri="{FF2B5EF4-FFF2-40B4-BE49-F238E27FC236}">
+                <a16:creationId xmlns:a16="http://schemas.microsoft.com/office/drawing/2014/main" id="{BEB24AA5-EBD6-4E4A-94BC-2F72D8BD9C68}"/>
+              </a:ext>
+            </a:extLst>
+          </p:cNvPr>
+          <p:cNvSpPr txBox="1"/>
+          <p:nvPr/>
+        </p:nvSpPr>
+        <p:spPr>
+          <a:xfrm>
+            <a:off x="5081439" y="3395905"/>
+            <a:ext cx="2029121" cy="369332"/>
+          </a:xfrm>
+          <a:prstGeom prst="rect">
+            <a:avLst/>
+          </a:prstGeom>
+          <a:noFill/>
+        </p:spPr>
+        <p:txBody>
+          <a:bodyPr wrap="square" rtlCol="0">
+            <a:spAutoFit/>
+          </a:bodyPr>
+          <a:lstStyle/>
+          <a:p>
+            <a:r>
+              <a:rPr lang="en-US" dirty="0">
+                <a:solidFill>
+                  <a:schemeClr val="tx1">
+                    <a:alpha val="20000"/>
+                  </a:schemeClr>
+                </a:solidFill>
+                <a:effectLst>
+                  <a:outerShdw blurRad="50800" dist="50800" dir="5400000" algn="ctr" rotWithShape="0">
+                    <a:srgbClr val="000000">
+                      <a:alpha val="0"/>
+                    </a:srgbClr>
+                  </a:outerShdw>
+                </a:effectLst>
+              </a:rPr>
+              <a:t>aegis4048.github.io</a:t>
+            </a:r>
+          </a:p>
+        </p:txBody>
+      </p:sp>
+      <p:sp>
+        <p:nvSpPr>
+          <p:cNvPr id="7" name="TextBox 6">
+            <a:extLst>
+              <a:ext uri="{FF2B5EF4-FFF2-40B4-BE49-F238E27FC236}">
+                <a16:creationId xmlns:a16="http://schemas.microsoft.com/office/drawing/2014/main" id="{622296BA-DBD5-4EAE-8F31-2C679CCA751D}"/>
+              </a:ext>
+            </a:extLst>
+          </p:cNvPr>
+          <p:cNvSpPr txBox="1"/>
+          <p:nvPr/>
+        </p:nvSpPr>
+        <p:spPr>
+          <a:xfrm>
+            <a:off x="9315359" y="3395905"/>
+            <a:ext cx="2029121" cy="369332"/>
+          </a:xfrm>
+          <a:prstGeom prst="rect">
+            <a:avLst/>
+          </a:prstGeom>
+          <a:noFill/>
+        </p:spPr>
+        <p:txBody>
+          <a:bodyPr wrap="square" rtlCol="0">
+            <a:spAutoFit/>
+          </a:bodyPr>
+          <a:lstStyle/>
+          <a:p>
+            <a:r>
+              <a:rPr lang="en-US" dirty="0">
+                <a:solidFill>
+                  <a:schemeClr val="tx1">
+                    <a:alpha val="20000"/>
+                  </a:schemeClr>
+                </a:solidFill>
+                <a:effectLst>
+                  <a:outerShdw blurRad="50800" dist="50800" dir="5400000" algn="ctr" rotWithShape="0">
+                    <a:srgbClr val="000000">
+                      <a:alpha val="0"/>
+                    </a:srgbClr>
+                  </a:outerShdw>
+                </a:effectLst>
+              </a:rPr>
+              <a:t>aegis4048.github.io</a:t>
+            </a:r>
+          </a:p>
+        </p:txBody>
+      </p:sp>
     </p:spTree>
     <p:extLst>
       <p:ext uri="{BB962C8B-B14F-4D97-AF65-F5344CB8AC3E}">
-        <p14:creationId xmlns:p14="http://schemas.microsoft.com/office/powerpoint/2010/main" val="4197040151"/>
+        <p14:creationId xmlns:p14="http://schemas.microsoft.com/office/powerpoint/2010/main" val="1182496359"/>
       </p:ext>
     </p:extLst>
   </p:cSld>
@@ -51081,58 +52662,235 @@
       </p:grpSpPr>
       <p:sp>
         <p:nvSpPr>
-          <p:cNvPr id="2" name="Title 1">
-            <a:extLst>
-              <a:ext uri="{FF2B5EF4-FFF2-40B4-BE49-F238E27FC236}">
-                <a16:creationId xmlns:a16="http://schemas.microsoft.com/office/drawing/2014/main" id="{5ECDA26B-A948-4010-9842-419112015D6D}"/>
-              </a:ext>
-            </a:extLst>
-          </p:cNvPr>
-          <p:cNvSpPr>
-            <a:spLocks noGrp="1"/>
-          </p:cNvSpPr>
-          <p:nvPr>
-            <p:ph type="title"/>
-          </p:nvPr>
+          <p:cNvPr id="5" name="Rectangle 4">
+            <a:extLst>
+              <a:ext uri="{FF2B5EF4-FFF2-40B4-BE49-F238E27FC236}">
+                <a16:creationId xmlns:a16="http://schemas.microsoft.com/office/drawing/2014/main" id="{544C5752-F07C-4D42-AFE9-7AC8CCDE8AF7}"/>
+              </a:ext>
+            </a:extLst>
+          </p:cNvPr>
+          <p:cNvSpPr/>
+          <p:nvPr/>
         </p:nvSpPr>
-        <p:spPr/>
+        <p:spPr>
+          <a:xfrm>
+            <a:off x="253828" y="1855720"/>
+            <a:ext cx="11380959" cy="3449705"/>
+          </a:xfrm>
+          <a:prstGeom prst="rect">
+            <a:avLst/>
+          </a:prstGeom>
+          <a:noFill/>
+        </p:spPr>
+        <p:style>
+          <a:lnRef idx="2">
+            <a:schemeClr val="accent1">
+              <a:shade val="50000"/>
+            </a:schemeClr>
+          </a:lnRef>
+          <a:fillRef idx="1">
+            <a:schemeClr val="accent1"/>
+          </a:fillRef>
+          <a:effectRef idx="0">
+            <a:schemeClr val="accent1"/>
+          </a:effectRef>
+          <a:fontRef idx="minor">
+            <a:schemeClr val="lt1"/>
+          </a:fontRef>
+        </p:style>
         <p:txBody>
-          <a:bodyPr/>
+          <a:bodyPr rtlCol="0" anchor="ctr"/>
           <a:lstStyle/>
           <a:p>
+            <a:pPr algn="ctr"/>
             <a:endParaRPr lang="en-US"/>
+          </a:p>
+        </p:txBody>
+      </p:sp>
+      <p:pic>
+        <p:nvPicPr>
+          <p:cNvPr id="3" name="Picture 2">
+            <a:extLst>
+              <a:ext uri="{FF2B5EF4-FFF2-40B4-BE49-F238E27FC236}">
+                <a16:creationId xmlns:a16="http://schemas.microsoft.com/office/drawing/2014/main" id="{A07363CE-289C-4213-A276-D2A28C4B3226}"/>
+              </a:ext>
+            </a:extLst>
+          </p:cNvPr>
+          <p:cNvPicPr>
+            <a:picLocks noChangeAspect="1"/>
+          </p:cNvPicPr>
+          <p:nvPr/>
+        </p:nvPicPr>
+        <p:blipFill>
+          <a:blip r:embed="rId2">
+            <a:extLst>
+              <a:ext uri="{28A0092B-C50C-407E-A947-70E740481C1C}">
+                <a14:useLocalDpi xmlns:a14="http://schemas.microsoft.com/office/drawing/2010/main" val="0"/>
+              </a:ext>
+            </a:extLst>
+          </a:blip>
+          <a:stretch>
+            <a:fillRect/>
+          </a:stretch>
+        </p:blipFill>
+        <p:spPr>
+          <a:xfrm>
+            <a:off x="415126" y="2309556"/>
+            <a:ext cx="11058362" cy="2542032"/>
+          </a:xfrm>
+          <a:prstGeom prst="rect">
+            <a:avLst/>
+          </a:prstGeom>
+        </p:spPr>
+      </p:pic>
+      <p:sp>
+        <p:nvSpPr>
+          <p:cNvPr id="4" name="TextBox 3">
+            <a:extLst>
+              <a:ext uri="{FF2B5EF4-FFF2-40B4-BE49-F238E27FC236}">
+                <a16:creationId xmlns:a16="http://schemas.microsoft.com/office/drawing/2014/main" id="{EC4E902F-2190-4EB4-9DF0-E3E15594178E}"/>
+              </a:ext>
+            </a:extLst>
+          </p:cNvPr>
+          <p:cNvSpPr txBox="1"/>
+          <p:nvPr/>
+        </p:nvSpPr>
+        <p:spPr>
+          <a:xfrm>
+            <a:off x="847520" y="3395905"/>
+            <a:ext cx="2029121" cy="369332"/>
+          </a:xfrm>
+          <a:prstGeom prst="rect">
+            <a:avLst/>
+          </a:prstGeom>
+          <a:noFill/>
+        </p:spPr>
+        <p:txBody>
+          <a:bodyPr wrap="square" rtlCol="0">
+            <a:spAutoFit/>
+          </a:bodyPr>
+          <a:lstStyle/>
+          <a:p>
+            <a:r>
+              <a:rPr lang="en-US" dirty="0">
+                <a:solidFill>
+                  <a:schemeClr val="tx1">
+                    <a:alpha val="20000"/>
+                  </a:schemeClr>
+                </a:solidFill>
+                <a:effectLst>
+                  <a:outerShdw blurRad="50800" dist="50800" dir="5400000" algn="ctr" rotWithShape="0">
+                    <a:srgbClr val="000000">
+                      <a:alpha val="0"/>
+                    </a:srgbClr>
+                  </a:outerShdw>
+                </a:effectLst>
+              </a:rPr>
+              <a:t>aegis4048.github.io</a:t>
+            </a:r>
           </a:p>
         </p:txBody>
       </p:sp>
       <p:sp>
         <p:nvSpPr>
-          <p:cNvPr id="3" name="Content Placeholder 2">
-            <a:extLst>
-              <a:ext uri="{FF2B5EF4-FFF2-40B4-BE49-F238E27FC236}">
-                <a16:creationId xmlns:a16="http://schemas.microsoft.com/office/drawing/2014/main" id="{D0C286D1-AF2F-4EC6-B4B7-4B7CDC90DA4F}"/>
-              </a:ext>
-            </a:extLst>
-          </p:cNvPr>
-          <p:cNvSpPr>
-            <a:spLocks noGrp="1"/>
-          </p:cNvSpPr>
-          <p:nvPr>
-            <p:ph idx="1"/>
-          </p:nvPr>
+          <p:cNvPr id="6" name="TextBox 5">
+            <a:extLst>
+              <a:ext uri="{FF2B5EF4-FFF2-40B4-BE49-F238E27FC236}">
+                <a16:creationId xmlns:a16="http://schemas.microsoft.com/office/drawing/2014/main" id="{DFAF5A11-CFA2-4050-AFA6-B63B81CBFF46}"/>
+              </a:ext>
+            </a:extLst>
+          </p:cNvPr>
+          <p:cNvSpPr txBox="1"/>
+          <p:nvPr/>
         </p:nvSpPr>
-        <p:spPr/>
+        <p:spPr>
+          <a:xfrm>
+            <a:off x="5119202" y="3395905"/>
+            <a:ext cx="2029121" cy="369332"/>
+          </a:xfrm>
+          <a:prstGeom prst="rect">
+            <a:avLst/>
+          </a:prstGeom>
+          <a:noFill/>
+        </p:spPr>
         <p:txBody>
-          <a:bodyPr/>
+          <a:bodyPr wrap="square" rtlCol="0">
+            <a:spAutoFit/>
+          </a:bodyPr>
           <a:lstStyle/>
           <a:p>
-            <a:endParaRPr lang="en-US"/>
+            <a:r>
+              <a:rPr lang="en-US" dirty="0">
+                <a:solidFill>
+                  <a:schemeClr val="tx1">
+                    <a:alpha val="20000"/>
+                  </a:schemeClr>
+                </a:solidFill>
+                <a:effectLst>
+                  <a:outerShdw blurRad="50800" dist="50800" dir="5400000" algn="ctr" rotWithShape="0">
+                    <a:srgbClr val="000000">
+                      <a:alpha val="0"/>
+                    </a:srgbClr>
+                  </a:outerShdw>
+                </a:effectLst>
+              </a:rPr>
+              <a:t>aegis4048.github.io</a:t>
+            </a:r>
+          </a:p>
+        </p:txBody>
+      </p:sp>
+      <p:sp>
+        <p:nvSpPr>
+          <p:cNvPr id="7" name="TextBox 6">
+            <a:extLst>
+              <a:ext uri="{FF2B5EF4-FFF2-40B4-BE49-F238E27FC236}">
+                <a16:creationId xmlns:a16="http://schemas.microsoft.com/office/drawing/2014/main" id="{C13BEF0F-371D-4040-9A01-68B1EEA4F3D7}"/>
+              </a:ext>
+            </a:extLst>
+          </p:cNvPr>
+          <p:cNvSpPr txBox="1"/>
+          <p:nvPr/>
+        </p:nvSpPr>
+        <p:spPr>
+          <a:xfrm>
+            <a:off x="9315359" y="3395905"/>
+            <a:ext cx="2029121" cy="369332"/>
+          </a:xfrm>
+          <a:prstGeom prst="rect">
+            <a:avLst/>
+          </a:prstGeom>
+          <a:noFill/>
+        </p:spPr>
+        <p:txBody>
+          <a:bodyPr wrap="square" rtlCol="0">
+            <a:spAutoFit/>
+          </a:bodyPr>
+          <a:lstStyle/>
+          <a:p>
+            <a:r>
+              <a:rPr lang="en-US" dirty="0">
+                <a:solidFill>
+                  <a:schemeClr val="tx1">
+                    <a:alpha val="20000"/>
+                  </a:schemeClr>
+                </a:solidFill>
+                <a:effectLst>
+                  <a:outerShdw blurRad="50800" dist="50800" dir="5400000" algn="ctr" rotWithShape="0">
+                    <a:srgbClr val="000000">
+                      <a:alpha val="0"/>
+                    </a:srgbClr>
+                  </a:outerShdw>
+                </a:effectLst>
+              </a:rPr>
+              <a:t>aegis4048.github.io</a:t>
+            </a:r>
           </a:p>
         </p:txBody>
       </p:sp>
     </p:spTree>
     <p:extLst>
       <p:ext uri="{BB962C8B-B14F-4D97-AF65-F5344CB8AC3E}">
-        <p14:creationId xmlns:p14="http://schemas.microsoft.com/office/powerpoint/2010/main" val="2436602171"/>
+        <p14:creationId xmlns:p14="http://schemas.microsoft.com/office/powerpoint/2010/main" val="4197040151"/>
       </p:ext>
     </p:extLst>
   </p:cSld>

</xml_diff>